<commit_message>
Merge up adding content to discuss if required.
</commit_message>
<xml_diff>
--- a/ISTEA-WatITis2015.pptx
+++ b/ISTEA-WatITis2015.pptx
@@ -5,10 +5,10 @@
     <p:sldMasterId id="2147483648" r:id="rId1"/>
   </p:sldMasterIdLst>
   <p:notesMasterIdLst>
-    <p:notesMasterId r:id="rId53"/>
+    <p:notesMasterId r:id="rId57"/>
   </p:notesMasterIdLst>
   <p:handoutMasterIdLst>
-    <p:handoutMasterId r:id="rId54"/>
+    <p:handoutMasterId r:id="rId58"/>
   </p:handoutMasterIdLst>
   <p:sldIdLst>
     <p:sldId id="256" r:id="rId2"/>
@@ -36,32 +36,36 @@
     <p:sldId id="299" r:id="rId24"/>
     <p:sldId id="300" r:id="rId25"/>
     <p:sldId id="303" r:id="rId26"/>
-    <p:sldId id="304" r:id="rId27"/>
-    <p:sldId id="305" r:id="rId28"/>
-    <p:sldId id="306" r:id="rId29"/>
-    <p:sldId id="296" r:id="rId30"/>
-    <p:sldId id="289" r:id="rId31"/>
-    <p:sldId id="290" r:id="rId32"/>
-    <p:sldId id="291" r:id="rId33"/>
-    <p:sldId id="292" r:id="rId34"/>
-    <p:sldId id="277" r:id="rId35"/>
-    <p:sldId id="319" r:id="rId36"/>
-    <p:sldId id="307" r:id="rId37"/>
-    <p:sldId id="308" r:id="rId38"/>
-    <p:sldId id="309" r:id="rId39"/>
-    <p:sldId id="302" r:id="rId40"/>
-    <p:sldId id="301" r:id="rId41"/>
-    <p:sldId id="279" r:id="rId42"/>
-    <p:sldId id="310" r:id="rId43"/>
-    <p:sldId id="311" r:id="rId44"/>
-    <p:sldId id="280" r:id="rId45"/>
-    <p:sldId id="312" r:id="rId46"/>
-    <p:sldId id="313" r:id="rId47"/>
-    <p:sldId id="314" r:id="rId48"/>
-    <p:sldId id="316" r:id="rId49"/>
-    <p:sldId id="317" r:id="rId50"/>
-    <p:sldId id="318" r:id="rId51"/>
-    <p:sldId id="258" r:id="rId52"/>
+    <p:sldId id="320" r:id="rId27"/>
+    <p:sldId id="304" r:id="rId28"/>
+    <p:sldId id="321" r:id="rId29"/>
+    <p:sldId id="305" r:id="rId30"/>
+    <p:sldId id="322" r:id="rId31"/>
+    <p:sldId id="306" r:id="rId32"/>
+    <p:sldId id="323" r:id="rId33"/>
+    <p:sldId id="296" r:id="rId34"/>
+    <p:sldId id="289" r:id="rId35"/>
+    <p:sldId id="290" r:id="rId36"/>
+    <p:sldId id="291" r:id="rId37"/>
+    <p:sldId id="292" r:id="rId38"/>
+    <p:sldId id="277" r:id="rId39"/>
+    <p:sldId id="319" r:id="rId40"/>
+    <p:sldId id="307" r:id="rId41"/>
+    <p:sldId id="308" r:id="rId42"/>
+    <p:sldId id="309" r:id="rId43"/>
+    <p:sldId id="302" r:id="rId44"/>
+    <p:sldId id="301" r:id="rId45"/>
+    <p:sldId id="279" r:id="rId46"/>
+    <p:sldId id="310" r:id="rId47"/>
+    <p:sldId id="311" r:id="rId48"/>
+    <p:sldId id="280" r:id="rId49"/>
+    <p:sldId id="312" r:id="rId50"/>
+    <p:sldId id="313" r:id="rId51"/>
+    <p:sldId id="314" r:id="rId52"/>
+    <p:sldId id="316" r:id="rId53"/>
+    <p:sldId id="317" r:id="rId54"/>
+    <p:sldId id="318" r:id="rId55"/>
+    <p:sldId id="258" r:id="rId56"/>
   </p:sldIdLst>
   <p:sldSz cx="9144000" cy="6858000" type="screen4x3"/>
   <p:notesSz cx="6858000" cy="9144000"/>
@@ -6075,7 +6079,7 @@
           <a:p>
             <a:fld id="{3EBD304B-4F32-DB42-AA51-EDA38B867F6B}" type="datetimeFigureOut">
               <a:rPr lang="en-US" smtClean="0"/>
-              <a:t>12/6/15</a:t>
+              <a:t>12/7/15</a:t>
             </a:fld>
             <a:endParaRPr lang="en-US"/>
           </a:p>
@@ -6270,7 +6274,7 @@
               <a:pPr>
                 <a:defRPr/>
               </a:pPr>
-              <a:t>12/6/15</a:t>
+              <a:t>12/7/15</a:t>
             </a:fld>
             <a:endParaRPr lang="en-US"/>
           </a:p>
@@ -7093,7 +7097,7 @@
               <a:pPr>
                 <a:defRPr/>
               </a:pPr>
-              <a:t>29</a:t>
+              <a:t>33</a:t>
             </a:fld>
             <a:endParaRPr lang="en-US"/>
           </a:p>
@@ -7334,7 +7338,7 @@
               <a:pPr>
                 <a:defRPr/>
               </a:pPr>
-              <a:t>33</a:t>
+              <a:t>37</a:t>
             </a:fld>
             <a:endParaRPr lang="en-US"/>
           </a:p>
@@ -7690,7 +7694,7 @@
               <a:pPr>
                 <a:defRPr/>
               </a:pPr>
-              <a:t>49</a:t>
+              <a:t>53</a:t>
             </a:fld>
             <a:endParaRPr lang="en-US"/>
           </a:p>
@@ -7751,7 +7755,7 @@
               <ma14:placeholderFlag xmlns:ma14="http://schemas.microsoft.com/office/mac/drawingml/2011/main" val="1"/>
             </a:ext>
             <a:ext uri="{909E8E84-426E-40dd-AFC4-6F175D3DCCD1}">
-              <a14:hiddenFill xmlns:a14="http://schemas.microsoft.com/office/drawing/2010/main" xmlns="">
+              <a14:hiddenFill xmlns="" xmlns:a14="http://schemas.microsoft.com/office/drawing/2010/main">
                 <a:solidFill>
                   <a:srgbClr val="FFFFFF"/>
                 </a:solidFill>
@@ -7773,14 +7777,14 @@
         <p:spPr bwMode="auto">
           <a:extLst>
             <a:ext uri="{909E8E84-426E-40dd-AFC4-6F175D3DCCD1}">
-              <a14:hiddenFill xmlns:a14="http://schemas.microsoft.com/office/drawing/2010/main" xmlns="">
+              <a14:hiddenFill xmlns="" xmlns:a14="http://schemas.microsoft.com/office/drawing/2010/main">
                 <a:solidFill>
                   <a:srgbClr val="FFFFFF"/>
                 </a:solidFill>
               </a14:hiddenFill>
             </a:ext>
             <a:ext uri="{91240B29-F687-4f45-9708-019B960494DF}">
-              <a14:hiddenLine xmlns:a14="http://schemas.microsoft.com/office/drawing/2010/main" xmlns="" w="9525">
+              <a14:hiddenLine xmlns="" xmlns:a14="http://schemas.microsoft.com/office/drawing/2010/main" w="9525">
                 <a:solidFill>
                   <a:srgbClr val="000000"/>
                 </a:solidFill>
@@ -7873,14 +7877,14 @@
           <a:noFill/>
           <a:extLst>
             <a:ext uri="{909E8E84-426E-40dd-AFC4-6F175D3DCCD1}">
-              <a14:hiddenFill xmlns:a14="http://schemas.microsoft.com/office/drawing/2010/main" xmlns="">
+              <a14:hiddenFill xmlns="" xmlns:a14="http://schemas.microsoft.com/office/drawing/2010/main">
                 <a:solidFill>
                   <a:srgbClr val="FFFFFF"/>
                 </a:solidFill>
               </a14:hiddenFill>
             </a:ext>
             <a:ext uri="{91240B29-F687-4f45-9708-019B960494DF}">
-              <a14:hiddenLine xmlns:a14="http://schemas.microsoft.com/office/drawing/2010/main" xmlns="" w="9525">
+              <a14:hiddenLine xmlns="" xmlns:a14="http://schemas.microsoft.com/office/drawing/2010/main" w="9525">
                 <a:solidFill>
                   <a:srgbClr val="000000"/>
                 </a:solidFill>
@@ -8024,7 +8028,7 @@
                   <a:spcPct val="0"/>
                 </a:spcAft>
               </a:pPr>
-              <a:t>51</a:t>
+              <a:t>55</a:t>
             </a:fld>
             <a:endParaRPr lang="en-US" sz="1200"/>
           </a:p>
@@ -8582,31 +8586,7 @@
                 <a:ea typeface="ＭＳ Ｐゴシック" charset="0"/>
                 <a:cs typeface="ＭＳ Ｐゴシック" charset="0"/>
               </a:rPr>
-              <a:t>One day a business unit identifies some problem with their current technology. For this example we will </a:t>
-            </a:r>
-            <a:r>
-              <a:rPr lang="en-US" sz="1200" b="0" i="0" kern="1200" baseline="0" dirty="0" smtClean="0">
-                <a:solidFill>
-                  <a:schemeClr val="tx1"/>
-                </a:solidFill>
-                <a:effectLst/>
-                <a:latin typeface="+mn-lt"/>
-                <a:ea typeface="ＭＳ Ｐゴシック" charset="0"/>
-                <a:cs typeface="ＭＳ Ｐゴシック" charset="0"/>
-              </a:rPr>
-              <a:t>look at </a:t>
-            </a:r>
-            <a:r>
-              <a:rPr lang="en-US" sz="1200" b="0" i="0" kern="1200" baseline="0" dirty="0" smtClean="0">
-                <a:solidFill>
-                  <a:schemeClr val="tx1"/>
-                </a:solidFill>
-                <a:effectLst/>
-                <a:latin typeface="+mn-lt"/>
-                <a:ea typeface="ＭＳ Ｐゴシック" charset="0"/>
-                <a:cs typeface="ＭＳ Ｐゴシック" charset="0"/>
-              </a:rPr>
-              <a:t>the anvil production line in the ACME Academy ‘Anvil Department.’ The Anvil Department has a production management system that keeps track of how many anvils are needed, when they are needed, and how much iron ore is needed to make them.  They realize that the tool they’ve been using for years fails to capture and validate some key information on the way into the production system.  They learned this the hard way after creating and delivering 200 anvils when the requestor only needed 2.  They’ve always known there was a problem with validation but they always cautioned users to be careful.  This one slipped through and, while it seems like a simple fix, the system vendor has moved on to a new version and doesn’t support changing the system they are running on.</a:t>
+              <a:t>One day a business unit identifies some problem with their current technology. For this example we will look at the anvil production line in the ACME Academy ‘Anvil Department.’ The Anvil Department has a production management system that keeps track of how many anvils are needed, when they are needed, and how much iron ore is needed to make them.  They realize that the tool they’ve been using for years fails to capture and validate some key information on the way into the production system.  They learned this the hard way after creating and delivering 200 anvils when the requestor only needed 2.  They’ve always known there was a problem with validation but they always cautioned users to be careful.  This one slipped through and, while it seems like a simple fix, the system vendor has moved on to a new version and doesn’t support changing the system they are running on.</a:t>
             </a:r>
           </a:p>
           <a:p>
@@ -8706,8 +8686,21 @@
                 <a:ea typeface="ＭＳ Ｐゴシック" charset="0"/>
                 <a:cs typeface="ＭＳ Ｐゴシック" charset="0"/>
               </a:rPr>
-              <a:t>Three weeks go by when the anvil department receives </a:t>
-            </a:r>
+              <a:t>Three weeks go by when the anvil department receives a call. The ACME finance department is asking why the anvil department hasn’t validated their monthly expenses in the finance system. After some digging they realize there was a process in the old system that ran a report and put the output on a network share.  The people involved thought the new system dealt with that so they didn’t mention it.  Turns out that old report does not exist in the new system. They scrape the bottom of their budget (running a little over) and contract the cloud provider to make the report for them.  Close call but all is resolved.  Back to anvil production.</a:t>
+            </a:r>
+          </a:p>
+          <a:p>
+            <a:endParaRPr lang="en-US" sz="1200" b="0" i="0" kern="1200" baseline="0" dirty="0" smtClean="0">
+              <a:solidFill>
+                <a:schemeClr val="tx1"/>
+              </a:solidFill>
+              <a:effectLst/>
+              <a:latin typeface="+mn-lt"/>
+              <a:ea typeface="ＭＳ Ｐゴシック" charset="0"/>
+              <a:cs typeface="ＭＳ Ｐゴシック" charset="0"/>
+            </a:endParaRPr>
+          </a:p>
+          <a:p>
             <a:r>
               <a:rPr lang="en-US" sz="1200" b="0" i="0" kern="1200" baseline="0" dirty="0" smtClean="0">
                 <a:solidFill>
@@ -8718,164 +8711,7 @@
                 <a:ea typeface="ＭＳ Ｐゴシック" charset="0"/>
                 <a:cs typeface="ＭＳ Ｐゴシック" charset="0"/>
               </a:rPr>
-              <a:t>a call</a:t>
-            </a:r>
-            <a:r>
-              <a:rPr lang="en-US" sz="1200" b="0" i="0" kern="1200" baseline="0" dirty="0" smtClean="0">
-                <a:solidFill>
-                  <a:schemeClr val="tx1"/>
-                </a:solidFill>
-                <a:effectLst/>
-                <a:latin typeface="+mn-lt"/>
-                <a:ea typeface="ＭＳ Ｐゴシック" charset="0"/>
-                <a:cs typeface="ＭＳ Ｐゴシック" charset="0"/>
-              </a:rPr>
-              <a:t>. The ACME finance department </a:t>
-            </a:r>
-            <a:r>
-              <a:rPr lang="en-US" sz="1200" b="0" i="0" kern="1200" baseline="0" dirty="0" smtClean="0">
-                <a:solidFill>
-                  <a:schemeClr val="tx1"/>
-                </a:solidFill>
-                <a:effectLst/>
-                <a:latin typeface="+mn-lt"/>
-                <a:ea typeface="ＭＳ Ｐゴシック" charset="0"/>
-                <a:cs typeface="ＭＳ Ｐゴシック" charset="0"/>
-              </a:rPr>
-              <a:t>is </a:t>
-            </a:r>
-            <a:r>
-              <a:rPr lang="en-US" sz="1200" b="0" i="0" kern="1200" baseline="0" dirty="0" smtClean="0">
-                <a:solidFill>
-                  <a:schemeClr val="tx1"/>
-                </a:solidFill>
-                <a:effectLst/>
-                <a:latin typeface="+mn-lt"/>
-                <a:ea typeface="ＭＳ Ｐゴシック" charset="0"/>
-                <a:cs typeface="ＭＳ Ｐゴシック" charset="0"/>
-              </a:rPr>
-              <a:t>asking why the anvil department hasn’t validated their monthly expenses in the </a:t>
-            </a:r>
-            <a:r>
-              <a:rPr lang="en-US" sz="1200" b="0" i="0" kern="1200" baseline="0" dirty="0" smtClean="0">
-                <a:solidFill>
-                  <a:schemeClr val="tx1"/>
-                </a:solidFill>
-                <a:effectLst/>
-                <a:latin typeface="+mn-lt"/>
-                <a:ea typeface="ＭＳ Ｐゴシック" charset="0"/>
-                <a:cs typeface="ＭＳ Ｐゴシック" charset="0"/>
-              </a:rPr>
-              <a:t>finance </a:t>
-            </a:r>
-            <a:r>
-              <a:rPr lang="en-US" sz="1200" b="0" i="0" kern="1200" baseline="0" dirty="0" smtClean="0">
-                <a:solidFill>
-                  <a:schemeClr val="tx1"/>
-                </a:solidFill>
-                <a:effectLst/>
-                <a:latin typeface="+mn-lt"/>
-                <a:ea typeface="ＭＳ Ｐゴシック" charset="0"/>
-                <a:cs typeface="ＭＳ Ｐゴシック" charset="0"/>
-              </a:rPr>
-              <a:t>system. After some digging they realize there was </a:t>
-            </a:r>
-            <a:r>
-              <a:rPr lang="en-US" sz="1200" b="0" i="0" kern="1200" baseline="0" dirty="0" smtClean="0">
-                <a:solidFill>
-                  <a:schemeClr val="tx1"/>
-                </a:solidFill>
-                <a:effectLst/>
-                <a:latin typeface="+mn-lt"/>
-                <a:ea typeface="ＭＳ Ｐゴシック" charset="0"/>
-                <a:cs typeface="ＭＳ Ｐゴシック" charset="0"/>
-              </a:rPr>
-              <a:t>a process </a:t>
-            </a:r>
-            <a:r>
-              <a:rPr lang="en-US" sz="1200" b="0" i="0" kern="1200" baseline="0" dirty="0" smtClean="0">
-                <a:solidFill>
-                  <a:schemeClr val="tx1"/>
-                </a:solidFill>
-                <a:effectLst/>
-                <a:latin typeface="+mn-lt"/>
-                <a:ea typeface="ＭＳ Ｐゴシック" charset="0"/>
-                <a:cs typeface="ＭＳ Ｐゴシック" charset="0"/>
-              </a:rPr>
-              <a:t>in the old system that ran a report and put the output </a:t>
-            </a:r>
-            <a:r>
-              <a:rPr lang="en-US" sz="1200" b="0" i="0" kern="1200" baseline="0" dirty="0" smtClean="0">
-                <a:solidFill>
-                  <a:schemeClr val="tx1"/>
-                </a:solidFill>
-                <a:effectLst/>
-                <a:latin typeface="+mn-lt"/>
-                <a:ea typeface="ＭＳ Ｐゴシック" charset="0"/>
-                <a:cs typeface="ＭＳ Ｐゴシック" charset="0"/>
-              </a:rPr>
-              <a:t>on a </a:t>
-            </a:r>
-            <a:r>
-              <a:rPr lang="en-US" sz="1200" b="0" i="0" kern="1200" baseline="0" dirty="0" smtClean="0">
-                <a:solidFill>
-                  <a:schemeClr val="tx1"/>
-                </a:solidFill>
-                <a:effectLst/>
-                <a:latin typeface="+mn-lt"/>
-                <a:ea typeface="ＭＳ Ｐゴシック" charset="0"/>
-                <a:cs typeface="ＭＳ Ｐゴシック" charset="0"/>
-              </a:rPr>
-              <a:t>network share.  The people involved thought the new system dealt with that so they didn’t mention it.  Turns out that old report does not exist in the new system. They scrape the bottom of their budget (running a little over) and contract the cloud provider to make the report for them.  Close call but all is resolved.  Back to anvil production.</a:t>
-            </a:r>
-          </a:p>
-          <a:p>
-            <a:endParaRPr lang="en-US" sz="1200" b="0" i="0" kern="1200" baseline="0" dirty="0" smtClean="0">
-              <a:solidFill>
-                <a:schemeClr val="tx1"/>
-              </a:solidFill>
-              <a:effectLst/>
-              <a:latin typeface="+mn-lt"/>
-              <a:ea typeface="ＭＳ Ｐゴシック" charset="0"/>
-              <a:cs typeface="ＭＳ Ｐゴシック" charset="0"/>
-            </a:endParaRPr>
-          </a:p>
-          <a:p>
-            <a:r>
-              <a:rPr lang="en-US" sz="1200" b="0" i="0" kern="1200" baseline="0" dirty="0" smtClean="0">
-                <a:solidFill>
-                  <a:schemeClr val="tx1"/>
-                </a:solidFill>
-                <a:effectLst/>
-                <a:latin typeface="+mn-lt"/>
-                <a:ea typeface="ＭＳ Ｐゴシック" charset="0"/>
-                <a:cs typeface="ＭＳ Ｐゴシック" charset="0"/>
-              </a:rPr>
-              <a:t>Then another couple weeks go by and they receive a call from the ACME police saying a former employee had been stopped with a car full of anvils.  They look at the production management system and realize that person had been </a:t>
-            </a:r>
-            <a:r>
-              <a:rPr lang="en-US" sz="1200" b="0" i="0" kern="1200" baseline="0" dirty="0" smtClean="0">
-                <a:solidFill>
-                  <a:schemeClr val="tx1"/>
-                </a:solidFill>
-                <a:effectLst/>
-                <a:latin typeface="+mn-lt"/>
-                <a:ea typeface="ＭＳ Ｐゴシック" charset="0"/>
-                <a:cs typeface="ＭＳ Ｐゴシック" charset="0"/>
-              </a:rPr>
-              <a:t>requesting anvils for </a:t>
-            </a:r>
-            <a:r>
-              <a:rPr lang="en-US" sz="1200" b="0" i="0" kern="1200" baseline="0" dirty="0" smtClean="0">
-                <a:solidFill>
-                  <a:schemeClr val="tx1"/>
-                </a:solidFill>
-                <a:effectLst/>
-                <a:latin typeface="+mn-lt"/>
-                <a:ea typeface="ＭＳ Ｐゴシック" charset="0"/>
-                <a:cs typeface="ＭＳ Ｐゴシック" charset="0"/>
-              </a:rPr>
-              <a:t>weeks.  The anvil department phones HR to ask why they weren’t notified of this person’s departure.  The HR department tells them they don’t notify everyone, they update the central authentication system.  A couple more phone calls and the anvil department realizes they need IT to help configure the central authentication system for use in their cloud solution.  Luckily the protocol is supported by the cloud solution so anvil schedules some ‘emergency’ work with the ACME IT department.</a:t>
+              <a:t>Then another couple weeks go by and they receive a call from the ACME police saying a former employee had been stopped with a car full of anvils.  They look at the production management system and realize that person had been requesting anvils for weeks.  The anvil department phones HR to ask why they weren’t notified of this person’s departure.  The HR department tells them they don’t notify everyone, they update the central authentication system.  A couple more phone calls and the anvil department realizes they need IT to help configure the central authentication system for use in their cloud solution.  Luckily the protocol is supported by the cloud solution so anvil schedules some ‘emergency’ work with the ACME IT department.</a:t>
             </a:r>
           </a:p>
           <a:p>
@@ -8925,43 +8761,7 @@
                 <a:ea typeface="ＭＳ Ｐゴシック" charset="0"/>
                 <a:cs typeface="ＭＳ Ｐゴシック" charset="0"/>
               </a:rPr>
-              <a:t>Then </a:t>
-            </a:r>
-            <a:r>
-              <a:rPr lang="en-US" sz="1200" b="0" i="0" kern="1200" baseline="0" dirty="0" smtClean="0">
-                <a:solidFill>
-                  <a:schemeClr val="tx1"/>
-                </a:solidFill>
-                <a:effectLst/>
-                <a:latin typeface="+mn-lt"/>
-                <a:ea typeface="ＭＳ Ｐゴシック" charset="0"/>
-                <a:cs typeface="ＭＳ Ｐゴシック" charset="0"/>
-              </a:rPr>
-              <a:t>the HR department calls. The auditors have reviewed the enterprise operations and ACME has had major problems with anvil related injuries. They ask the anvil department to initiate a training program to keep people from receiving anvils without the necessary training.  They realize that their system does not support this and, so, they have to go shopping for a new </a:t>
-            </a:r>
-            <a:r>
-              <a:rPr lang="en-US" sz="1200" b="0" i="0" kern="1200" baseline="0" dirty="0" smtClean="0">
-                <a:solidFill>
-                  <a:schemeClr val="tx1"/>
-                </a:solidFill>
-                <a:effectLst/>
-                <a:latin typeface="+mn-lt"/>
-                <a:ea typeface="ＭＳ Ｐゴシック" charset="0"/>
-                <a:cs typeface="ＭＳ Ｐゴシック" charset="0"/>
-              </a:rPr>
-              <a:t>anvil training </a:t>
-            </a:r>
-            <a:r>
-              <a:rPr lang="en-US" sz="1200" b="0" i="0" kern="1200" baseline="0" dirty="0" smtClean="0">
-                <a:solidFill>
-                  <a:schemeClr val="tx1"/>
-                </a:solidFill>
-                <a:effectLst/>
-                <a:latin typeface="+mn-lt"/>
-                <a:ea typeface="ＭＳ Ｐゴシック" charset="0"/>
-                <a:cs typeface="ＭＳ Ｐゴシック" charset="0"/>
-              </a:rPr>
-              <a:t>system.  They pay a new vendor and the original cloud vendor to build a nice slick integrated anvil production management system with safety interlocks.</a:t>
+              <a:t>Then the HR department calls. The auditors have reviewed the enterprise operations and ACME has had major problems with anvil related injuries. They ask the anvil department to initiate a training program to keep people from receiving anvils without the necessary training.  They realize that their system does not support this and, so, they have to go shopping for a new anvil training system.  They pay a new vendor and the original cloud vendor to build a nice slick integrated anvil production management system with safety interlocks.</a:t>
             </a:r>
           </a:p>
           <a:p>
@@ -12716,14 +12516,14 @@
           </a:ln>
           <a:extLst>
             <a:ext uri="{909E8E84-426E-40dd-AFC4-6F175D3DCCD1}">
-              <a14:hiddenFill xmlns:a14="http://schemas.microsoft.com/office/drawing/2010/main" xmlns="">
+              <a14:hiddenFill xmlns="" xmlns:a14="http://schemas.microsoft.com/office/drawing/2010/main">
                 <a:solidFill>
                   <a:srgbClr val="FFFFFF"/>
                 </a:solidFill>
               </a14:hiddenFill>
             </a:ext>
             <a:ext uri="{91240B29-F687-4f45-9708-019B960494DF}">
-              <a14:hiddenLine xmlns:a14="http://schemas.microsoft.com/office/drawing/2010/main" xmlns="" w="9525">
+              <a14:hiddenLine xmlns="" xmlns:a14="http://schemas.microsoft.com/office/drawing/2010/main" w="9525">
                 <a:solidFill>
                   <a:srgbClr val="000000"/>
                 </a:solidFill>
@@ -13503,14 +13303,14 @@
           </a:ln>
           <a:extLst>
             <a:ext uri="{909E8E84-426E-40dd-AFC4-6F175D3DCCD1}">
-              <a14:hiddenFill xmlns:a14="http://schemas.microsoft.com/office/drawing/2010/main" xmlns="">
+              <a14:hiddenFill xmlns="" xmlns:a14="http://schemas.microsoft.com/office/drawing/2010/main">
                 <a:solidFill>
                   <a:srgbClr val="FFFFFF"/>
                 </a:solidFill>
               </a14:hiddenFill>
             </a:ext>
             <a:ext uri="{91240B29-F687-4f45-9708-019B960494DF}">
-              <a14:hiddenLine xmlns:a14="http://schemas.microsoft.com/office/drawing/2010/main" xmlns="" w="9525">
+              <a14:hiddenLine xmlns="" xmlns:a14="http://schemas.microsoft.com/office/drawing/2010/main" w="9525">
                 <a:solidFill>
                   <a:srgbClr val="000000"/>
                 </a:solidFill>
@@ -20156,7 +19956,6 @@
               <a:rPr lang="en-US" dirty="0"/>
               <a:t>Business Press, 2009. </a:t>
             </a:r>
-            <a:endParaRPr lang="en-US" dirty="0"/>
           </a:p>
           <a:p>
             <a:endParaRPr lang="en-US" dirty="0"/>
@@ -20288,36 +20087,19 @@
               <a:rPr lang="en-US" dirty="0" smtClean="0"/>
               <a:t>Many unknown interdependencies are created.</a:t>
             </a:r>
-            <a:endParaRPr lang="en-US" dirty="0" smtClean="0"/>
           </a:p>
           <a:p>
             <a:pPr lvl="2"/>
             <a:r>
               <a:rPr lang="en-US" dirty="0" smtClean="0"/>
-              <a:t>Increased </a:t>
-            </a:r>
+              <a:t>Increased costs (to maintain)</a:t>
+            </a:r>
+          </a:p>
+          <a:p>
+            <a:pPr lvl="2"/>
             <a:r>
               <a:rPr lang="en-US" dirty="0" smtClean="0"/>
-              <a:t>costs </a:t>
-            </a:r>
-            <a:r>
-              <a:rPr lang="en-US" dirty="0" smtClean="0"/>
-              <a:t>(to maintain)</a:t>
-            </a:r>
-          </a:p>
-          <a:p>
-            <a:pPr lvl="2"/>
-            <a:r>
-              <a:rPr lang="en-US" dirty="0" smtClean="0"/>
-              <a:t>Increased </a:t>
-            </a:r>
-            <a:r>
-              <a:rPr lang="en-US" dirty="0" smtClean="0"/>
-              <a:t>risks (to change</a:t>
-            </a:r>
-            <a:r>
-              <a:rPr lang="en-US" dirty="0" smtClean="0"/>
-              <a:t>)</a:t>
+              <a:t>Increased risks (to change)</a:t>
             </a:r>
           </a:p>
           <a:p>
@@ -20337,11 +20119,7 @@
             <a:pPr lvl="2"/>
             <a:r>
               <a:rPr lang="en-US" dirty="0" smtClean="0"/>
-              <a:t>This l</a:t>
-            </a:r>
-            <a:r>
-              <a:rPr lang="en-US" dirty="0" smtClean="0"/>
-              <a:t>imits the whole enterprise’s </a:t>
+              <a:t>This limits the whole enterprise’s </a:t>
             </a:r>
             <a:r>
               <a:rPr lang="en-US" dirty="0"/>
@@ -20442,13 +20220,8 @@
             </a:pPr>
             <a:r>
               <a:rPr lang="en-US" dirty="0" smtClean="0"/>
-              <a:t>This is where </a:t>
-            </a:r>
-            <a:r>
-              <a:rPr lang="en-US" dirty="0" smtClean="0"/>
-              <a:t>Enterprise Architecture (EA) helps.</a:t>
-            </a:r>
-            <a:endParaRPr lang="en-US" dirty="0" smtClean="0"/>
+              <a:t>This is where Enterprise Architecture (EA) helps.</a:t>
+            </a:r>
           </a:p>
         </p:txBody>
       </p:sp>
@@ -20851,15 +20624,7 @@
             </a:r>
             <a:r>
               <a:rPr lang="en-US" dirty="0" smtClean="0"/>
-              <a:t>enterprise components </a:t>
-            </a:r>
-            <a:r>
-              <a:rPr lang="en-US" dirty="0" smtClean="0"/>
-              <a:t>that are</a:t>
-            </a:r>
-            <a:r>
-              <a:rPr lang="en-US" dirty="0" smtClean="0"/>
-              <a:t>:</a:t>
+              <a:t>enterprise components that are:</a:t>
             </a:r>
             <a:endParaRPr lang="en-US" dirty="0"/>
           </a:p>
@@ -20963,11 +20728,7 @@
             <a:pPr algn="ctr"/>
             <a:r>
               <a:rPr lang="en-US" dirty="0" smtClean="0"/>
-              <a:t>WHAT</a:t>
-            </a:r>
-            <a:r>
-              <a:rPr lang="en-US" dirty="0" smtClean="0"/>
-              <a:t>?</a:t>
+              <a:t>WHAT?</a:t>
             </a:r>
             <a:br>
               <a:rPr lang="en-US" dirty="0" smtClean="0"/>
@@ -21067,19 +20828,7 @@
           <a:p>
             <a:r>
               <a:rPr lang="en-US" dirty="0" smtClean="0"/>
-              <a:t>What </a:t>
-            </a:r>
-            <a:r>
-              <a:rPr lang="en-US" dirty="0" smtClean="0"/>
-              <a:t>IS </a:t>
-            </a:r>
-            <a:r>
-              <a:rPr lang="en-US" dirty="0" smtClean="0"/>
-              <a:t>Enterprise </a:t>
-            </a:r>
-            <a:r>
-              <a:rPr lang="en-US" dirty="0" smtClean="0"/>
-              <a:t>Architecture?</a:t>
+              <a:t>What IS Enterprise Architecture?</a:t>
             </a:r>
             <a:endParaRPr lang="en-US" dirty="0"/>
           </a:p>
@@ -21114,21 +20863,8 @@
             </a:r>
             <a:r>
               <a:rPr lang="en-US" dirty="0" smtClean="0"/>
-              <a:t>nterprises must reach consensus about what EA is to them </a:t>
-            </a:r>
-            <a:r>
-              <a:rPr lang="en-US" dirty="0" smtClean="0"/>
-              <a:t>(often captured in </a:t>
-            </a:r>
-            <a:r>
-              <a:rPr lang="en-US" dirty="0" smtClean="0"/>
-              <a:t>an “Enterprise Architecture </a:t>
-            </a:r>
-            <a:r>
-              <a:rPr lang="en-US" dirty="0" smtClean="0"/>
-              <a:t>Framework”)</a:t>
-            </a:r>
-            <a:endParaRPr lang="en-US" dirty="0" smtClean="0"/>
+              <a:t>nterprises must reach consensus about what EA is to them (often captured in an “Enterprise Architecture Framework”)</a:t>
+            </a:r>
           </a:p>
           <a:p>
             <a:pPr lvl="1"/>
@@ -21162,15 +20898,7 @@
             </a:r>
             <a:r>
               <a:rPr lang="en-US" b="1" dirty="0" smtClean="0"/>
-              <a:t>“University of Waterloo </a:t>
-            </a:r>
-            <a:r>
-              <a:rPr lang="en-US" b="1" dirty="0" smtClean="0"/>
-              <a:t>Enterprise Architecture Framework</a:t>
-            </a:r>
-            <a:r>
-              <a:rPr lang="en-US" b="1" dirty="0" smtClean="0"/>
-              <a:t>” ?</a:t>
+              <a:t>“University of Waterloo Enterprise Architecture Framework” ?</a:t>
             </a:r>
             <a:endParaRPr lang="en-US" b="1" dirty="0"/>
           </a:p>
@@ -21432,7 +21160,6 @@
               <a:rPr lang="en-US" sz="1800" dirty="0" smtClean="0"/>
               <a:t>are we today</a:t>
             </a:r>
-            <a:endParaRPr lang="en-US" sz="1800" dirty="0" smtClean="0"/>
           </a:p>
           <a:p>
             <a:pPr fontAlgn="auto">
@@ -21518,14 +21245,14 @@
           <a:noFill/>
           <a:extLst>
             <a:ext uri="{909E8E84-426E-40dd-AFC4-6F175D3DCCD1}">
-              <a14:hiddenFill xmlns:a14="http://schemas.microsoft.com/office/drawing/2010/main" xmlns="">
+              <a14:hiddenFill xmlns="" xmlns:a14="http://schemas.microsoft.com/office/drawing/2010/main">
                 <a:solidFill>
                   <a:srgbClr val="FFFFFF"/>
                 </a:solidFill>
               </a14:hiddenFill>
             </a:ext>
             <a:ext uri="{91240B29-F687-4f45-9708-019B960494DF}">
-              <a14:hiddenLine xmlns:a14="http://schemas.microsoft.com/office/drawing/2010/main" xmlns="" w="9525">
+              <a14:hiddenLine xmlns="" xmlns:a14="http://schemas.microsoft.com/office/drawing/2010/main" w="9525">
                 <a:solidFill>
                   <a:srgbClr val="000000"/>
                 </a:solidFill>
@@ -21756,7 +21483,6 @@
               <a:rPr lang="en-US" dirty="0" smtClean="0"/>
               <a:t>Federation of Enterprise Architecture Professional Organizations (FEAPO)</a:t>
             </a:r>
-            <a:endParaRPr lang="en-US" dirty="0" smtClean="0"/>
           </a:p>
           <a:p>
             <a:pPr marL="0" indent="0">
@@ -21883,15 +21609,7 @@
           <a:p>
             <a:r>
               <a:rPr lang="en-US" dirty="0" smtClean="0"/>
-              <a:t>Current </a:t>
-            </a:r>
-            <a:r>
-              <a:rPr lang="en-US" dirty="0" smtClean="0"/>
-              <a:t>framework </a:t>
-            </a:r>
-            <a:r>
-              <a:rPr lang="en-US" dirty="0" smtClean="0"/>
-              <a:t>definition:</a:t>
+              <a:t>Current framework definition:</a:t>
             </a:r>
           </a:p>
           <a:p>
@@ -22518,15 +22236,7 @@
           <a:p>
             <a:r>
               <a:rPr lang="en-US" dirty="0" smtClean="0"/>
-              <a:t>SOURCE: California </a:t>
-            </a:r>
-            <a:r>
-              <a:rPr lang="en-US" smtClean="0"/>
-              <a:t>Enterprise Architecture Framework </a:t>
-            </a:r>
-            <a:r>
-              <a:rPr lang="en-US" dirty="0" smtClean="0"/>
-              <a:t>2.0</a:t>
+              <a:t>SOURCE: California Enterprise Architecture Framework 2.0</a:t>
             </a:r>
             <a:endParaRPr lang="en-US" dirty="0"/>
           </a:p>
@@ -22710,6 +22420,168 @@
           <a:p>
             <a:r>
               <a:rPr lang="en-US" dirty="0" smtClean="0"/>
+              <a:t>Business Architecture</a:t>
+            </a:r>
+            <a:endParaRPr lang="en-US" dirty="0"/>
+          </a:p>
+        </p:txBody>
+      </p:sp>
+      <p:sp>
+        <p:nvSpPr>
+          <p:cNvPr id="4" name="Footer Placeholder 3"/>
+          <p:cNvSpPr>
+            <a:spLocks noGrp="1"/>
+          </p:cNvSpPr>
+          <p:nvPr>
+            <p:ph type="ftr" sz="quarter" idx="10"/>
+          </p:nvPr>
+        </p:nvSpPr>
+        <p:spPr/>
+        <p:txBody>
+          <a:bodyPr/>
+          <a:lstStyle/>
+          <a:p>
+            <a:pPr>
+              <a:defRPr/>
+            </a:pPr>
+            <a:r>
+              <a:rPr lang="en-US" dirty="0" smtClean="0"/>
+              <a:t>Enterprise Architecture @ Waterloo</a:t>
+            </a:r>
+            <a:endParaRPr lang="en-US" dirty="0"/>
+          </a:p>
+        </p:txBody>
+      </p:sp>
+      <p:sp>
+        <p:nvSpPr>
+          <p:cNvPr id="6" name="TextBox 5"/>
+          <p:cNvSpPr txBox="1"/>
+          <p:nvPr/>
+        </p:nvSpPr>
+        <p:spPr>
+          <a:xfrm>
+            <a:off x="3132161" y="5377218"/>
+            <a:ext cx="5725236" cy="369332"/>
+          </a:xfrm>
+          <a:prstGeom prst="rect">
+            <a:avLst/>
+          </a:prstGeom>
+          <a:noFill/>
+        </p:spPr>
+        <p:txBody>
+          <a:bodyPr wrap="square" rtlCol="0">
+            <a:spAutoFit/>
+          </a:bodyPr>
+          <a:lstStyle/>
+          <a:p>
+            <a:r>
+              <a:rPr lang="en-US" dirty="0" smtClean="0"/>
+              <a:t>SOURCE: California </a:t>
+            </a:r>
+            <a:r>
+              <a:rPr lang="en-US" smtClean="0"/>
+              <a:t>Enterprise Architecture Framework </a:t>
+            </a:r>
+            <a:r>
+              <a:rPr lang="en-US" dirty="0" smtClean="0"/>
+              <a:t>2.0</a:t>
+            </a:r>
+            <a:endParaRPr lang="en-US" dirty="0"/>
+          </a:p>
+        </p:txBody>
+      </p:sp>
+      <p:pic>
+        <p:nvPicPr>
+          <p:cNvPr id="3" name="Picture 2"/>
+          <p:cNvPicPr>
+            <a:picLocks noChangeAspect="1"/>
+          </p:cNvPicPr>
+          <p:nvPr/>
+        </p:nvPicPr>
+        <p:blipFill>
+          <a:blip r:embed="rId2">
+            <a:extLst>
+              <a:ext uri="{28A0092B-C50C-407E-A947-70E740481C1C}">
+                <a14:useLocalDpi xmlns:a14="http://schemas.microsoft.com/office/drawing/2010/main" val="0"/>
+              </a:ext>
+            </a:extLst>
+          </a:blip>
+          <a:stretch>
+            <a:fillRect/>
+          </a:stretch>
+        </p:blipFill>
+        <p:spPr>
+          <a:xfrm>
+            <a:off x="635000" y="1430338"/>
+            <a:ext cx="7874000" cy="3708400"/>
+          </a:xfrm>
+          <a:prstGeom prst="rect">
+            <a:avLst/>
+          </a:prstGeom>
+        </p:spPr>
+      </p:pic>
+    </p:spTree>
+    <p:extLst>
+      <p:ext uri="{BB962C8B-B14F-4D97-AF65-F5344CB8AC3E}">
+        <p14:creationId xmlns:p14="http://schemas.microsoft.com/office/powerpoint/2010/main" val="1825627206"/>
+      </p:ext>
+    </p:extLst>
+  </p:cSld>
+  <p:clrMapOvr>
+    <a:masterClrMapping/>
+  </p:clrMapOvr>
+  <mc:AlternateContent xmlns:mc="http://schemas.openxmlformats.org/markup-compatibility/2006">
+    <mc:Choice xmlns:p14="http://schemas.microsoft.com/office/powerpoint/2010/main" Requires="p14">
+      <p:transition spd="slow" p14:dur="2000"/>
+    </mc:Choice>
+    <mc:Fallback>
+      <p:transition spd="slow"/>
+    </mc:Fallback>
+  </mc:AlternateContent>
+  <p:timing>
+    <p:tnLst>
+      <p:par>
+        <p:cTn id="1" dur="indefinite" restart="never" nodeType="tmRoot"/>
+      </p:par>
+    </p:tnLst>
+  </p:timing>
+</p:sld>
+</file>
+
+<file path=ppt/slides/slide27.xml><?xml version="1.0" encoding="utf-8"?>
+<p:sld xmlns:a="http://schemas.openxmlformats.org/drawingml/2006/main" xmlns:r="http://schemas.openxmlformats.org/officeDocument/2006/relationships" xmlns:p="http://schemas.openxmlformats.org/presentationml/2006/main" show="0">
+  <p:cSld>
+    <p:spTree>
+      <p:nvGrpSpPr>
+        <p:cNvPr id="1" name=""/>
+        <p:cNvGrpSpPr/>
+        <p:nvPr/>
+      </p:nvGrpSpPr>
+      <p:grpSpPr>
+        <a:xfrm>
+          <a:off x="0" y="0"/>
+          <a:ext cx="0" cy="0"/>
+          <a:chOff x="0" y="0"/>
+          <a:chExt cx="0" cy="0"/>
+        </a:xfrm>
+      </p:grpSpPr>
+      <p:sp>
+        <p:nvSpPr>
+          <p:cNvPr id="2" name="Title 1"/>
+          <p:cNvSpPr>
+            <a:spLocks noGrp="1"/>
+          </p:cNvSpPr>
+          <p:nvPr>
+            <p:ph type="title"/>
+          </p:nvPr>
+        </p:nvSpPr>
+        <p:spPr/>
+        <p:txBody>
+          <a:bodyPr/>
+          <a:lstStyle/>
+          <a:p>
+            <a:r>
+              <a:rPr lang="en-US" dirty="0" smtClean="0"/>
               <a:t>Information Architecture</a:t>
             </a:r>
             <a:endParaRPr lang="en-US" dirty="0"/>
@@ -22800,7 +22672,7 @@
 </p:sld>
 </file>
 
-<file path=ppt/slides/slide27.xml><?xml version="1.0" encoding="utf-8"?>
+<file path=ppt/slides/slide28.xml><?xml version="1.0" encoding="utf-8"?>
 <p:sld xmlns:a="http://schemas.openxmlformats.org/drawingml/2006/main" xmlns:r="http://schemas.openxmlformats.org/officeDocument/2006/relationships" xmlns:p="http://schemas.openxmlformats.org/presentationml/2006/main" show="0">
   <p:cSld>
     <p:spTree>
@@ -22834,6 +22706,168 @@
           <a:p>
             <a:r>
               <a:rPr lang="en-US" dirty="0" smtClean="0"/>
+              <a:t>Information Architecture</a:t>
+            </a:r>
+            <a:endParaRPr lang="en-US" dirty="0"/>
+          </a:p>
+        </p:txBody>
+      </p:sp>
+      <p:sp>
+        <p:nvSpPr>
+          <p:cNvPr id="4" name="Footer Placeholder 3"/>
+          <p:cNvSpPr>
+            <a:spLocks noGrp="1"/>
+          </p:cNvSpPr>
+          <p:nvPr>
+            <p:ph type="ftr" sz="quarter" idx="10"/>
+          </p:nvPr>
+        </p:nvSpPr>
+        <p:spPr/>
+        <p:txBody>
+          <a:bodyPr/>
+          <a:lstStyle/>
+          <a:p>
+            <a:pPr>
+              <a:defRPr/>
+            </a:pPr>
+            <a:r>
+              <a:rPr lang="en-US" dirty="0" smtClean="0"/>
+              <a:t>Enterprise Architecture @ Waterloo</a:t>
+            </a:r>
+            <a:endParaRPr lang="en-US" dirty="0"/>
+          </a:p>
+        </p:txBody>
+      </p:sp>
+      <p:sp>
+        <p:nvSpPr>
+          <p:cNvPr id="6" name="TextBox 5"/>
+          <p:cNvSpPr txBox="1"/>
+          <p:nvPr/>
+        </p:nvSpPr>
+        <p:spPr>
+          <a:xfrm>
+            <a:off x="3132161" y="5377218"/>
+            <a:ext cx="5725236" cy="369332"/>
+          </a:xfrm>
+          <a:prstGeom prst="rect">
+            <a:avLst/>
+          </a:prstGeom>
+          <a:noFill/>
+        </p:spPr>
+        <p:txBody>
+          <a:bodyPr wrap="square" rtlCol="0">
+            <a:spAutoFit/>
+          </a:bodyPr>
+          <a:lstStyle/>
+          <a:p>
+            <a:r>
+              <a:rPr lang="en-US" dirty="0" smtClean="0"/>
+              <a:t>SOURCE: California </a:t>
+            </a:r>
+            <a:r>
+              <a:rPr lang="en-US" smtClean="0"/>
+              <a:t>Enterprise Architecture Framework </a:t>
+            </a:r>
+            <a:r>
+              <a:rPr lang="en-US" dirty="0" smtClean="0"/>
+              <a:t>2.0</a:t>
+            </a:r>
+            <a:endParaRPr lang="en-US" dirty="0"/>
+          </a:p>
+        </p:txBody>
+      </p:sp>
+      <p:pic>
+        <p:nvPicPr>
+          <p:cNvPr id="3" name="Picture 2"/>
+          <p:cNvPicPr>
+            <a:picLocks noChangeAspect="1"/>
+          </p:cNvPicPr>
+          <p:nvPr/>
+        </p:nvPicPr>
+        <p:blipFill>
+          <a:blip r:embed="rId2">
+            <a:extLst>
+              <a:ext uri="{28A0092B-C50C-407E-A947-70E740481C1C}">
+                <a14:useLocalDpi xmlns:a14="http://schemas.microsoft.com/office/drawing/2010/main" val="0"/>
+              </a:ext>
+            </a:extLst>
+          </a:blip>
+          <a:stretch>
+            <a:fillRect/>
+          </a:stretch>
+        </p:blipFill>
+        <p:spPr>
+          <a:xfrm>
+            <a:off x="1600200" y="1322118"/>
+            <a:ext cx="5943600" cy="3937000"/>
+          </a:xfrm>
+          <a:prstGeom prst="rect">
+            <a:avLst/>
+          </a:prstGeom>
+        </p:spPr>
+      </p:pic>
+    </p:spTree>
+    <p:extLst>
+      <p:ext uri="{BB962C8B-B14F-4D97-AF65-F5344CB8AC3E}">
+        <p14:creationId xmlns:p14="http://schemas.microsoft.com/office/powerpoint/2010/main" val="930582785"/>
+      </p:ext>
+    </p:extLst>
+  </p:cSld>
+  <p:clrMapOvr>
+    <a:masterClrMapping/>
+  </p:clrMapOvr>
+  <mc:AlternateContent xmlns:mc="http://schemas.openxmlformats.org/markup-compatibility/2006">
+    <mc:Choice xmlns:p14="http://schemas.microsoft.com/office/powerpoint/2010/main" Requires="p14">
+      <p:transition spd="slow" p14:dur="2000"/>
+    </mc:Choice>
+    <mc:Fallback>
+      <p:transition spd="slow"/>
+    </mc:Fallback>
+  </mc:AlternateContent>
+  <p:timing>
+    <p:tnLst>
+      <p:par>
+        <p:cTn id="1" dur="indefinite" restart="never" nodeType="tmRoot"/>
+      </p:par>
+    </p:tnLst>
+  </p:timing>
+</p:sld>
+</file>
+
+<file path=ppt/slides/slide29.xml><?xml version="1.0" encoding="utf-8"?>
+<p:sld xmlns:a="http://schemas.openxmlformats.org/drawingml/2006/main" xmlns:r="http://schemas.openxmlformats.org/officeDocument/2006/relationships" xmlns:p="http://schemas.openxmlformats.org/presentationml/2006/main" show="0">
+  <p:cSld>
+    <p:spTree>
+      <p:nvGrpSpPr>
+        <p:cNvPr id="1" name=""/>
+        <p:cNvGrpSpPr/>
+        <p:nvPr/>
+      </p:nvGrpSpPr>
+      <p:grpSpPr>
+        <a:xfrm>
+          <a:off x="0" y="0"/>
+          <a:ext cx="0" cy="0"/>
+          <a:chOff x="0" y="0"/>
+          <a:chExt cx="0" cy="0"/>
+        </a:xfrm>
+      </p:grpSpPr>
+      <p:sp>
+        <p:nvSpPr>
+          <p:cNvPr id="2" name="Title 1"/>
+          <p:cNvSpPr>
+            <a:spLocks noGrp="1"/>
+          </p:cNvSpPr>
+          <p:nvPr>
+            <p:ph type="title"/>
+          </p:nvPr>
+        </p:nvSpPr>
+        <p:spPr/>
+        <p:txBody>
+          <a:bodyPr/>
+          <a:lstStyle/>
+          <a:p>
+            <a:r>
+              <a:rPr lang="en-US" dirty="0" smtClean="0"/>
               <a:t>Applications Architecture</a:t>
             </a:r>
             <a:endParaRPr lang="en-US" dirty="0"/>
@@ -22894,7 +22928,277 @@
 </p:sld>
 </file>
 
-<file path=ppt/slides/slide28.xml><?xml version="1.0" encoding="utf-8"?>
+<file path=ppt/slides/slide3.xml><?xml version="1.0" encoding="utf-8"?>
+<p:sld xmlns:a="http://schemas.openxmlformats.org/drawingml/2006/main" xmlns:r="http://schemas.openxmlformats.org/officeDocument/2006/relationships" xmlns:p="http://schemas.openxmlformats.org/presentationml/2006/main">
+  <p:cSld>
+    <p:spTree>
+      <p:nvGrpSpPr>
+        <p:cNvPr id="1" name=""/>
+        <p:cNvGrpSpPr/>
+        <p:nvPr/>
+      </p:nvGrpSpPr>
+      <p:grpSpPr>
+        <a:xfrm>
+          <a:off x="0" y="0"/>
+          <a:ext cx="0" cy="0"/>
+          <a:chOff x="0" y="0"/>
+          <a:chExt cx="0" cy="0"/>
+        </a:xfrm>
+      </p:grpSpPr>
+      <p:sp>
+        <p:nvSpPr>
+          <p:cNvPr id="2" name="Title 1"/>
+          <p:cNvSpPr>
+            <a:spLocks noGrp="1"/>
+          </p:cNvSpPr>
+          <p:nvPr>
+            <p:ph type="title"/>
+          </p:nvPr>
+        </p:nvSpPr>
+        <p:spPr>
+          <a:xfrm>
+            <a:off x="457200" y="2492520"/>
+            <a:ext cx="8229600" cy="1143000"/>
+          </a:xfrm>
+        </p:spPr>
+        <p:txBody>
+          <a:bodyPr>
+            <a:normAutofit fontScale="90000"/>
+          </a:bodyPr>
+          <a:lstStyle/>
+          <a:p>
+            <a:pPr algn="ctr"/>
+            <a:r>
+              <a:rPr lang="en-US" dirty="0" smtClean="0"/>
+              <a:t>WHO?</a:t>
+            </a:r>
+            <a:br>
+              <a:rPr lang="en-US" dirty="0" smtClean="0"/>
+            </a:br>
+            <a:r>
+              <a:rPr lang="en-US" dirty="0" smtClean="0"/>
+              <a:t/>
+            </a:r>
+            <a:br>
+              <a:rPr lang="en-US" dirty="0" smtClean="0"/>
+            </a:br>
+            <a:r>
+              <a:rPr lang="en-US" dirty="0" smtClean="0"/>
+              <a:t>Enterprise Architecture Group</a:t>
+            </a:r>
+            <a:endParaRPr lang="en-US" dirty="0"/>
+          </a:p>
+        </p:txBody>
+      </p:sp>
+      <p:sp>
+        <p:nvSpPr>
+          <p:cNvPr id="4" name="Footer Placeholder 3"/>
+          <p:cNvSpPr>
+            <a:spLocks noGrp="1"/>
+          </p:cNvSpPr>
+          <p:nvPr>
+            <p:ph type="ftr" sz="quarter" idx="10"/>
+          </p:nvPr>
+        </p:nvSpPr>
+        <p:spPr/>
+        <p:txBody>
+          <a:bodyPr/>
+          <a:lstStyle/>
+          <a:p>
+            <a:pPr>
+              <a:defRPr/>
+            </a:pPr>
+            <a:r>
+              <a:rPr lang="en-US" dirty="0" smtClean="0"/>
+              <a:t>Enterprise Architecture @ Waterloo</a:t>
+            </a:r>
+            <a:endParaRPr lang="en-US" dirty="0"/>
+          </a:p>
+        </p:txBody>
+      </p:sp>
+    </p:spTree>
+    <p:extLst>
+      <p:ext uri="{BB962C8B-B14F-4D97-AF65-F5344CB8AC3E}">
+        <p14:creationId xmlns:p14="http://schemas.microsoft.com/office/powerpoint/2010/main" val="1698768535"/>
+      </p:ext>
+    </p:extLst>
+  </p:cSld>
+  <p:clrMapOvr>
+    <a:masterClrMapping/>
+  </p:clrMapOvr>
+  <p:timing>
+    <p:tnLst>
+      <p:par>
+        <p:cTn id="1" dur="indefinite" restart="never" nodeType="tmRoot"/>
+      </p:par>
+    </p:tnLst>
+  </p:timing>
+</p:sld>
+</file>
+
+<file path=ppt/slides/slide30.xml><?xml version="1.0" encoding="utf-8"?>
+<p:sld xmlns:a="http://schemas.openxmlformats.org/drawingml/2006/main" xmlns:r="http://schemas.openxmlformats.org/officeDocument/2006/relationships" xmlns:p="http://schemas.openxmlformats.org/presentationml/2006/main" show="0">
+  <p:cSld>
+    <p:spTree>
+      <p:nvGrpSpPr>
+        <p:cNvPr id="1" name=""/>
+        <p:cNvGrpSpPr/>
+        <p:nvPr/>
+      </p:nvGrpSpPr>
+      <p:grpSpPr>
+        <a:xfrm>
+          <a:off x="0" y="0"/>
+          <a:ext cx="0" cy="0"/>
+          <a:chOff x="0" y="0"/>
+          <a:chExt cx="0" cy="0"/>
+        </a:xfrm>
+      </p:grpSpPr>
+      <p:sp>
+        <p:nvSpPr>
+          <p:cNvPr id="2" name="Title 1"/>
+          <p:cNvSpPr>
+            <a:spLocks noGrp="1"/>
+          </p:cNvSpPr>
+          <p:nvPr>
+            <p:ph type="title"/>
+          </p:nvPr>
+        </p:nvSpPr>
+        <p:spPr/>
+        <p:txBody>
+          <a:bodyPr/>
+          <a:lstStyle/>
+          <a:p>
+            <a:r>
+              <a:rPr lang="en-US" dirty="0" smtClean="0"/>
+              <a:t>Applications Architecture</a:t>
+            </a:r>
+            <a:endParaRPr lang="en-US" dirty="0"/>
+          </a:p>
+        </p:txBody>
+      </p:sp>
+      <p:sp>
+        <p:nvSpPr>
+          <p:cNvPr id="4" name="Footer Placeholder 3"/>
+          <p:cNvSpPr>
+            <a:spLocks noGrp="1"/>
+          </p:cNvSpPr>
+          <p:nvPr>
+            <p:ph type="ftr" sz="quarter" idx="10"/>
+          </p:nvPr>
+        </p:nvSpPr>
+        <p:spPr/>
+        <p:txBody>
+          <a:bodyPr/>
+          <a:lstStyle/>
+          <a:p>
+            <a:pPr>
+              <a:defRPr/>
+            </a:pPr>
+            <a:r>
+              <a:rPr lang="en-US" dirty="0" smtClean="0"/>
+              <a:t>Enterprise Architecture @ Waterloo</a:t>
+            </a:r>
+            <a:endParaRPr lang="en-US" dirty="0"/>
+          </a:p>
+        </p:txBody>
+      </p:sp>
+      <p:sp>
+        <p:nvSpPr>
+          <p:cNvPr id="5" name="TextBox 4"/>
+          <p:cNvSpPr txBox="1"/>
+          <p:nvPr/>
+        </p:nvSpPr>
+        <p:spPr>
+          <a:xfrm>
+            <a:off x="3132161" y="5377218"/>
+            <a:ext cx="5725236" cy="369332"/>
+          </a:xfrm>
+          <a:prstGeom prst="rect">
+            <a:avLst/>
+          </a:prstGeom>
+          <a:noFill/>
+        </p:spPr>
+        <p:txBody>
+          <a:bodyPr wrap="square" rtlCol="0">
+            <a:spAutoFit/>
+          </a:bodyPr>
+          <a:lstStyle/>
+          <a:p>
+            <a:r>
+              <a:rPr lang="en-US" dirty="0" smtClean="0"/>
+              <a:t>SOURCE: California </a:t>
+            </a:r>
+            <a:r>
+              <a:rPr lang="en-US" smtClean="0"/>
+              <a:t>Enterprise Architecture Framework </a:t>
+            </a:r>
+            <a:r>
+              <a:rPr lang="en-US" dirty="0" smtClean="0"/>
+              <a:t>2.0</a:t>
+            </a:r>
+            <a:endParaRPr lang="en-US" dirty="0"/>
+          </a:p>
+        </p:txBody>
+      </p:sp>
+      <p:pic>
+        <p:nvPicPr>
+          <p:cNvPr id="3" name="Picture 2"/>
+          <p:cNvPicPr>
+            <a:picLocks noChangeAspect="1"/>
+          </p:cNvPicPr>
+          <p:nvPr/>
+        </p:nvPicPr>
+        <p:blipFill>
+          <a:blip r:embed="rId2">
+            <a:extLst>
+              <a:ext uri="{28A0092B-C50C-407E-A947-70E740481C1C}">
+                <a14:useLocalDpi xmlns:a14="http://schemas.microsoft.com/office/drawing/2010/main" val="0"/>
+              </a:ext>
+            </a:extLst>
+          </a:blip>
+          <a:stretch>
+            <a:fillRect/>
+          </a:stretch>
+        </p:blipFill>
+        <p:spPr>
+          <a:xfrm>
+            <a:off x="1629833" y="1071133"/>
+            <a:ext cx="5884333" cy="4306085"/>
+          </a:xfrm>
+          <a:prstGeom prst="rect">
+            <a:avLst/>
+          </a:prstGeom>
+        </p:spPr>
+      </p:pic>
+    </p:spTree>
+    <p:extLst>
+      <p:ext uri="{BB962C8B-B14F-4D97-AF65-F5344CB8AC3E}">
+        <p14:creationId xmlns:p14="http://schemas.microsoft.com/office/powerpoint/2010/main" val="695353543"/>
+      </p:ext>
+    </p:extLst>
+  </p:cSld>
+  <p:clrMapOvr>
+    <a:masterClrMapping/>
+  </p:clrMapOvr>
+  <mc:AlternateContent xmlns:mc="http://schemas.openxmlformats.org/markup-compatibility/2006">
+    <mc:Choice xmlns:p14="http://schemas.microsoft.com/office/powerpoint/2010/main" Requires="p14">
+      <p:transition spd="slow" p14:dur="2000"/>
+    </mc:Choice>
+    <mc:Fallback>
+      <p:transition spd="slow"/>
+    </mc:Fallback>
+  </mc:AlternateContent>
+  <p:timing>
+    <p:tnLst>
+      <p:par>
+        <p:cTn id="1" dur="indefinite" restart="never" nodeType="tmRoot"/>
+      </p:par>
+    </p:tnLst>
+  </p:timing>
+</p:sld>
+</file>
+
+<file path=ppt/slides/slide31.xml><?xml version="1.0" encoding="utf-8"?>
 <p:sld xmlns:a="http://schemas.openxmlformats.org/drawingml/2006/main" xmlns:r="http://schemas.openxmlformats.org/officeDocument/2006/relationships" xmlns:p="http://schemas.openxmlformats.org/presentationml/2006/main" show="0">
   <p:cSld>
     <p:spTree>
@@ -23018,7 +23322,169 @@
 </p:sld>
 </file>
 
-<file path=ppt/slides/slide29.xml><?xml version="1.0" encoding="utf-8"?>
+<file path=ppt/slides/slide32.xml><?xml version="1.0" encoding="utf-8"?>
+<p:sld xmlns:a="http://schemas.openxmlformats.org/drawingml/2006/main" xmlns:r="http://schemas.openxmlformats.org/officeDocument/2006/relationships" xmlns:p="http://schemas.openxmlformats.org/presentationml/2006/main" show="0">
+  <p:cSld>
+    <p:spTree>
+      <p:nvGrpSpPr>
+        <p:cNvPr id="1" name=""/>
+        <p:cNvGrpSpPr/>
+        <p:nvPr/>
+      </p:nvGrpSpPr>
+      <p:grpSpPr>
+        <a:xfrm>
+          <a:off x="0" y="0"/>
+          <a:ext cx="0" cy="0"/>
+          <a:chOff x="0" y="0"/>
+          <a:chExt cx="0" cy="0"/>
+        </a:xfrm>
+      </p:grpSpPr>
+      <p:sp>
+        <p:nvSpPr>
+          <p:cNvPr id="2" name="Title 1"/>
+          <p:cNvSpPr>
+            <a:spLocks noGrp="1"/>
+          </p:cNvSpPr>
+          <p:nvPr>
+            <p:ph type="title"/>
+          </p:nvPr>
+        </p:nvSpPr>
+        <p:spPr/>
+        <p:txBody>
+          <a:bodyPr/>
+          <a:lstStyle/>
+          <a:p>
+            <a:r>
+              <a:rPr lang="en-US" dirty="0" smtClean="0"/>
+              <a:t>Technology Architecture</a:t>
+            </a:r>
+            <a:endParaRPr lang="en-US" dirty="0"/>
+          </a:p>
+        </p:txBody>
+      </p:sp>
+      <p:sp>
+        <p:nvSpPr>
+          <p:cNvPr id="4" name="Footer Placeholder 3"/>
+          <p:cNvSpPr>
+            <a:spLocks noGrp="1"/>
+          </p:cNvSpPr>
+          <p:nvPr>
+            <p:ph type="ftr" sz="quarter" idx="10"/>
+          </p:nvPr>
+        </p:nvSpPr>
+        <p:spPr/>
+        <p:txBody>
+          <a:bodyPr/>
+          <a:lstStyle/>
+          <a:p>
+            <a:pPr>
+              <a:defRPr/>
+            </a:pPr>
+            <a:r>
+              <a:rPr lang="en-US" dirty="0" smtClean="0"/>
+              <a:t>Enterprise Architecture @ Waterloo</a:t>
+            </a:r>
+            <a:endParaRPr lang="en-US" dirty="0"/>
+          </a:p>
+        </p:txBody>
+      </p:sp>
+      <p:sp>
+        <p:nvSpPr>
+          <p:cNvPr id="6" name="TextBox 5"/>
+          <p:cNvSpPr txBox="1"/>
+          <p:nvPr/>
+        </p:nvSpPr>
+        <p:spPr>
+          <a:xfrm>
+            <a:off x="3132161" y="5377218"/>
+            <a:ext cx="5725236" cy="369332"/>
+          </a:xfrm>
+          <a:prstGeom prst="rect">
+            <a:avLst/>
+          </a:prstGeom>
+          <a:noFill/>
+        </p:spPr>
+        <p:txBody>
+          <a:bodyPr wrap="square" rtlCol="0">
+            <a:spAutoFit/>
+          </a:bodyPr>
+          <a:lstStyle/>
+          <a:p>
+            <a:r>
+              <a:rPr lang="en-US" dirty="0" smtClean="0"/>
+              <a:t>SOURCE: California </a:t>
+            </a:r>
+            <a:r>
+              <a:rPr lang="en-US" smtClean="0"/>
+              <a:t>Enterprise Architecture Framework </a:t>
+            </a:r>
+            <a:r>
+              <a:rPr lang="en-US" dirty="0" smtClean="0"/>
+              <a:t>2.0</a:t>
+            </a:r>
+            <a:endParaRPr lang="en-US" dirty="0"/>
+          </a:p>
+        </p:txBody>
+      </p:sp>
+      <p:pic>
+        <p:nvPicPr>
+          <p:cNvPr id="3" name="Picture 2"/>
+          <p:cNvPicPr>
+            <a:picLocks noChangeAspect="1"/>
+          </p:cNvPicPr>
+          <p:nvPr/>
+        </p:nvPicPr>
+        <p:blipFill>
+          <a:blip r:embed="rId2">
+            <a:extLst>
+              <a:ext uri="{28A0092B-C50C-407E-A947-70E740481C1C}">
+                <a14:useLocalDpi xmlns:a14="http://schemas.microsoft.com/office/drawing/2010/main" val="0"/>
+              </a:ext>
+            </a:extLst>
+          </a:blip>
+          <a:stretch>
+            <a:fillRect/>
+          </a:stretch>
+        </p:blipFill>
+        <p:spPr>
+          <a:xfrm>
+            <a:off x="774700" y="2006600"/>
+            <a:ext cx="7594600" cy="2844800"/>
+          </a:xfrm>
+          <a:prstGeom prst="rect">
+            <a:avLst/>
+          </a:prstGeom>
+        </p:spPr>
+      </p:pic>
+    </p:spTree>
+    <p:extLst>
+      <p:ext uri="{BB962C8B-B14F-4D97-AF65-F5344CB8AC3E}">
+        <p14:creationId xmlns:p14="http://schemas.microsoft.com/office/powerpoint/2010/main" val="1171783375"/>
+      </p:ext>
+    </p:extLst>
+  </p:cSld>
+  <p:clrMapOvr>
+    <a:masterClrMapping/>
+  </p:clrMapOvr>
+  <mc:AlternateContent xmlns:mc="http://schemas.openxmlformats.org/markup-compatibility/2006">
+    <mc:Choice xmlns:p14="http://schemas.microsoft.com/office/powerpoint/2010/main" Requires="p14">
+      <p:transition spd="slow" p14:dur="2000"/>
+    </mc:Choice>
+    <mc:Fallback>
+      <p:transition spd="slow"/>
+    </mc:Fallback>
+  </mc:AlternateContent>
+  <p:timing>
+    <p:tnLst>
+      <p:par>
+        <p:cTn id="1" dur="indefinite" restart="never" nodeType="tmRoot"/>
+      </p:par>
+    </p:tnLst>
+  </p:timing>
+</p:sld>
+</file>
+
+<file path=ppt/slides/slide33.xml><?xml version="1.0" encoding="utf-8"?>
 <p:sld xmlns:a="http://schemas.openxmlformats.org/drawingml/2006/main" xmlns:r="http://schemas.openxmlformats.org/officeDocument/2006/relationships" xmlns:p="http://schemas.openxmlformats.org/presentationml/2006/main">
   <p:cSld>
     <p:spTree>
@@ -23137,119 +23603,7 @@
 </p:sld>
 </file>
 
-<file path=ppt/slides/slide3.xml><?xml version="1.0" encoding="utf-8"?>
-<p:sld xmlns:a="http://schemas.openxmlformats.org/drawingml/2006/main" xmlns:r="http://schemas.openxmlformats.org/officeDocument/2006/relationships" xmlns:p="http://schemas.openxmlformats.org/presentationml/2006/main">
-  <p:cSld>
-    <p:spTree>
-      <p:nvGrpSpPr>
-        <p:cNvPr id="1" name=""/>
-        <p:cNvGrpSpPr/>
-        <p:nvPr/>
-      </p:nvGrpSpPr>
-      <p:grpSpPr>
-        <a:xfrm>
-          <a:off x="0" y="0"/>
-          <a:ext cx="0" cy="0"/>
-          <a:chOff x="0" y="0"/>
-          <a:chExt cx="0" cy="0"/>
-        </a:xfrm>
-      </p:grpSpPr>
-      <p:sp>
-        <p:nvSpPr>
-          <p:cNvPr id="2" name="Title 1"/>
-          <p:cNvSpPr>
-            <a:spLocks noGrp="1"/>
-          </p:cNvSpPr>
-          <p:nvPr>
-            <p:ph type="title"/>
-          </p:nvPr>
-        </p:nvSpPr>
-        <p:spPr>
-          <a:xfrm>
-            <a:off x="457200" y="2492520"/>
-            <a:ext cx="8229600" cy="1143000"/>
-          </a:xfrm>
-        </p:spPr>
-        <p:txBody>
-          <a:bodyPr>
-            <a:normAutofit fontScale="90000"/>
-          </a:bodyPr>
-          <a:lstStyle/>
-          <a:p>
-            <a:pPr algn="ctr"/>
-            <a:r>
-              <a:rPr lang="en-US" dirty="0" smtClean="0"/>
-              <a:t>WHO</a:t>
-            </a:r>
-            <a:r>
-              <a:rPr lang="en-US" dirty="0" smtClean="0"/>
-              <a:t>?</a:t>
-            </a:r>
-            <a:br>
-              <a:rPr lang="en-US" dirty="0" smtClean="0"/>
-            </a:br>
-            <a:r>
-              <a:rPr lang="en-US" dirty="0" smtClean="0"/>
-              <a:t/>
-            </a:r>
-            <a:br>
-              <a:rPr lang="en-US" dirty="0" smtClean="0"/>
-            </a:br>
-            <a:r>
-              <a:rPr lang="en-US" dirty="0" smtClean="0"/>
-              <a:t>Enterprise Architecture Group</a:t>
-            </a:r>
-            <a:endParaRPr lang="en-US" dirty="0"/>
-          </a:p>
-        </p:txBody>
-      </p:sp>
-      <p:sp>
-        <p:nvSpPr>
-          <p:cNvPr id="4" name="Footer Placeholder 3"/>
-          <p:cNvSpPr>
-            <a:spLocks noGrp="1"/>
-          </p:cNvSpPr>
-          <p:nvPr>
-            <p:ph type="ftr" sz="quarter" idx="10"/>
-          </p:nvPr>
-        </p:nvSpPr>
-        <p:spPr/>
-        <p:txBody>
-          <a:bodyPr/>
-          <a:lstStyle/>
-          <a:p>
-            <a:pPr>
-              <a:defRPr/>
-            </a:pPr>
-            <a:r>
-              <a:rPr lang="en-US" dirty="0" smtClean="0"/>
-              <a:t>Enterprise Architecture @ Waterloo</a:t>
-            </a:r>
-            <a:endParaRPr lang="en-US" dirty="0"/>
-          </a:p>
-        </p:txBody>
-      </p:sp>
-    </p:spTree>
-    <p:extLst>
-      <p:ext uri="{BB962C8B-B14F-4D97-AF65-F5344CB8AC3E}">
-        <p14:creationId xmlns:p14="http://schemas.microsoft.com/office/powerpoint/2010/main" val="1698768535"/>
-      </p:ext>
-    </p:extLst>
-  </p:cSld>
-  <p:clrMapOvr>
-    <a:masterClrMapping/>
-  </p:clrMapOvr>
-  <p:timing>
-    <p:tnLst>
-      <p:par>
-        <p:cTn id="1" dur="indefinite" restart="never" nodeType="tmRoot"/>
-      </p:par>
-    </p:tnLst>
-  </p:timing>
-</p:sld>
-</file>
-
-<file path=ppt/slides/slide30.xml><?xml version="1.0" encoding="utf-8"?>
+<file path=ppt/slides/slide34.xml><?xml version="1.0" encoding="utf-8"?>
 <p:sld xmlns:a="http://schemas.openxmlformats.org/drawingml/2006/main" xmlns:r="http://schemas.openxmlformats.org/officeDocument/2006/relationships" xmlns:p="http://schemas.openxmlformats.org/presentationml/2006/main">
   <p:cSld>
     <p:spTree>
@@ -23414,7 +23768,7 @@
 </p:sld>
 </file>
 
-<file path=ppt/slides/slide31.xml><?xml version="1.0" encoding="utf-8"?>
+<file path=ppt/slides/slide35.xml><?xml version="1.0" encoding="utf-8"?>
 <p:sld xmlns:a="http://schemas.openxmlformats.org/drawingml/2006/main" xmlns:r="http://schemas.openxmlformats.org/officeDocument/2006/relationships" xmlns:p="http://schemas.openxmlformats.org/presentationml/2006/main">
   <p:cSld>
     <p:spTree>
@@ -23536,7 +23890,7 @@
 </p:sld>
 </file>
 
-<file path=ppt/slides/slide32.xml><?xml version="1.0" encoding="utf-8"?>
+<file path=ppt/slides/slide36.xml><?xml version="1.0" encoding="utf-8"?>
 <p:sld xmlns:a="http://schemas.openxmlformats.org/drawingml/2006/main" xmlns:r="http://schemas.openxmlformats.org/officeDocument/2006/relationships" xmlns:p="http://schemas.openxmlformats.org/presentationml/2006/main">
   <p:cSld>
     <p:spTree>
@@ -23572,22 +23926,14 @@
           <a:p>
             <a:r>
               <a:rPr lang="en-US" dirty="0" smtClean="0"/>
-              <a:t>Waterloo’s EA</a:t>
-            </a:r>
-            <a:r>
-              <a:rPr lang="en-US" dirty="0" smtClean="0"/>
-              <a:t>–</a:t>
+              <a:t>Waterloo’s EA–</a:t>
             </a:r>
             <a:br>
               <a:rPr lang="en-US" dirty="0" smtClean="0"/>
             </a:br>
             <a:r>
               <a:rPr lang="en-US" dirty="0" smtClean="0"/>
-              <a:t>DOMAIN INTERCONNECTED </a:t>
-            </a:r>
-            <a:r>
-              <a:rPr lang="en-US" dirty="0" smtClean="0"/>
-              <a:t>MODEL</a:t>
+              <a:t>DOMAIN INTERCONNECTED MODEL</a:t>
             </a:r>
             <a:endParaRPr lang="en-US" dirty="0"/>
           </a:p>
@@ -23653,13 +23999,13 @@
   <p:clrMapOvr>
     <a:masterClrMapping/>
   </p:clrMapOvr>
-  <mc:AlternateContent xmlns:mc="http://schemas.openxmlformats.org/markup-compatibility/2006">
-    <mc:Choice xmlns:p14="http://schemas.microsoft.com/office/powerpoint/2010/main" Requires="p14">
+  <mc:AlternateContent xmlns:mc="http://schemas.openxmlformats.org/markup-compatibility/2006" xmlns:p14="http://schemas.microsoft.com/office/powerpoint/2010/main">
+    <mc:Choice Requires="p14">
       <p:transition p14:dur="100">
         <p:cut/>
       </p:transition>
     </mc:Choice>
-    <mc:Fallback>
+    <mc:Fallback xmlns="">
       <p:transition>
         <p:cut/>
       </p:transition>
@@ -23675,7 +24021,7 @@
 </p:sld>
 </file>
 
-<file path=ppt/slides/slide33.xml><?xml version="1.0" encoding="utf-8"?>
+<file path=ppt/slides/slide37.xml><?xml version="1.0" encoding="utf-8"?>
 <p:sld xmlns:a="http://schemas.openxmlformats.org/drawingml/2006/main" xmlns:r="http://schemas.openxmlformats.org/officeDocument/2006/relationships" xmlns:p="http://schemas.openxmlformats.org/presentationml/2006/main">
   <p:cSld>
     <p:spTree>
@@ -23827,7 +24173,7 @@
 </p:sld>
 </file>
 
-<file path=ppt/slides/slide34.xml><?xml version="1.0" encoding="utf-8"?>
+<file path=ppt/slides/slide38.xml><?xml version="1.0" encoding="utf-8"?>
 <p:sld xmlns:a="http://schemas.openxmlformats.org/drawingml/2006/main" xmlns:r="http://schemas.openxmlformats.org/officeDocument/2006/relationships" xmlns:p="http://schemas.openxmlformats.org/presentationml/2006/main">
   <p:cSld>
     <p:spTree>
@@ -23869,11 +24215,7 @@
             <a:pPr algn="ctr"/>
             <a:r>
               <a:rPr lang="en-US" dirty="0" smtClean="0"/>
-              <a:t>HOW</a:t>
-            </a:r>
-            <a:r>
-              <a:rPr lang="en-US" dirty="0" smtClean="0"/>
-              <a:t>?</a:t>
+              <a:t>HOW?</a:t>
             </a:r>
             <a:br>
               <a:rPr lang="en-US" dirty="0" smtClean="0"/>
@@ -23939,7 +24281,7 @@
 </p:sld>
 </file>
 
-<file path=ppt/slides/slide35.xml><?xml version="1.0" encoding="utf-8"?>
+<file path=ppt/slides/slide39.xml><?xml version="1.0" encoding="utf-8"?>
 <p:sld xmlns:a="http://schemas.openxmlformats.org/drawingml/2006/main" xmlns:r="http://schemas.openxmlformats.org/officeDocument/2006/relationships" xmlns:p="http://schemas.openxmlformats.org/presentationml/2006/main">
   <p:cSld>
     <p:spTree>
@@ -24003,11 +24345,7 @@
             </a:pPr>
             <a:r>
               <a:rPr lang="en-US" dirty="0" smtClean="0"/>
-              <a:t>Enterprise Architec</a:t>
-            </a:r>
-            <a:r>
-              <a:rPr lang="en-US" dirty="0" smtClean="0"/>
-              <a:t>ture @ Waterloo</a:t>
+              <a:t>Enterprise Architecture @ Waterloo</a:t>
             </a:r>
             <a:endParaRPr lang="en-US" dirty="0"/>
           </a:p>
@@ -24104,7 +24442,7 @@
 </p:sld>
 </file>
 
-<file path=ppt/slides/slide36.xml><?xml version="1.0" encoding="utf-8"?>
+<file path=ppt/slides/slide4.xml><?xml version="1.0" encoding="utf-8"?>
 <p:sld xmlns:a="http://schemas.openxmlformats.org/drawingml/2006/main" xmlns:r="http://schemas.openxmlformats.org/officeDocument/2006/relationships" xmlns:p="http://schemas.openxmlformats.org/presentationml/2006/main">
   <p:cSld>
     <p:spTree>
@@ -24137,8 +24475,54 @@
           <a:lstStyle/>
           <a:p>
             <a:r>
+              <a:rPr lang="en-US" dirty="0" smtClean="0"/>
+              <a:t>Who – The enterprise architecture group</a:t>
+            </a:r>
+            <a:endParaRPr lang="en-US" dirty="0"/>
+          </a:p>
+        </p:txBody>
+      </p:sp>
+      <p:sp>
+        <p:nvSpPr>
+          <p:cNvPr id="3" name="Content Placeholder 2"/>
+          <p:cNvSpPr>
+            <a:spLocks noGrp="1"/>
+          </p:cNvSpPr>
+          <p:nvPr>
+            <p:ph idx="1"/>
+          </p:nvPr>
+        </p:nvSpPr>
+        <p:spPr/>
+        <p:txBody>
+          <a:bodyPr/>
+          <a:lstStyle/>
+          <a:p>
+            <a:r>
+              <a:rPr lang="en-US" dirty="0" smtClean="0"/>
+              <a:t>Mandate</a:t>
+            </a:r>
+          </a:p>
+          <a:p>
+            <a:pPr lvl="1"/>
+            <a:r>
+              <a:rPr lang="en-US" dirty="0" smtClean="0"/>
+              <a:t>The </a:t>
+            </a:r>
+            <a:r>
               <a:rPr lang="en-US" dirty="0"/>
-              <a:t>Enterprise Architecture Process</a:t>
+              <a:t>mandate of this group is to </a:t>
+            </a:r>
+            <a:r>
+              <a:rPr lang="en-US" dirty="0">
+                <a:solidFill>
+                  <a:schemeClr val="tx1"/>
+                </a:solidFill>
+              </a:rPr>
+              <a:t>develop</a:t>
+            </a:r>
+            <a:r>
+              <a:rPr lang="en-US" dirty="0"/>
+              <a:t> the enterprise architecture strategy, framework and program for the university that addresses both current and future information management and information technology needs.</a:t>
             </a:r>
           </a:p>
         </p:txBody>
@@ -24163,11 +24547,92 @@
             </a:pPr>
             <a:r>
               <a:rPr lang="en-US" dirty="0" smtClean="0"/>
-              <a:t>Enterprise Architec</a:t>
-            </a:r>
+              <a:t>Enterprise Architecture @ Waterloo</a:t>
+            </a:r>
+            <a:endParaRPr lang="en-US" dirty="0"/>
+          </a:p>
+        </p:txBody>
+      </p:sp>
+    </p:spTree>
+    <p:extLst>
+      <p:ext uri="{BB962C8B-B14F-4D97-AF65-F5344CB8AC3E}">
+        <p14:creationId xmlns:p14="http://schemas.microsoft.com/office/powerpoint/2010/main" val="1173392265"/>
+      </p:ext>
+    </p:extLst>
+  </p:cSld>
+  <p:clrMapOvr>
+    <a:masterClrMapping/>
+  </p:clrMapOvr>
+  <p:timing>
+    <p:tnLst>
+      <p:par>
+        <p:cTn id="1" dur="indefinite" restart="never" nodeType="tmRoot"/>
+      </p:par>
+    </p:tnLst>
+  </p:timing>
+</p:sld>
+</file>
+
+<file path=ppt/slides/slide40.xml><?xml version="1.0" encoding="utf-8"?>
+<p:sld xmlns:a="http://schemas.openxmlformats.org/drawingml/2006/main" xmlns:r="http://schemas.openxmlformats.org/officeDocument/2006/relationships" xmlns:p="http://schemas.openxmlformats.org/presentationml/2006/main">
+  <p:cSld>
+    <p:spTree>
+      <p:nvGrpSpPr>
+        <p:cNvPr id="1" name=""/>
+        <p:cNvGrpSpPr/>
+        <p:nvPr/>
+      </p:nvGrpSpPr>
+      <p:grpSpPr>
+        <a:xfrm>
+          <a:off x="0" y="0"/>
+          <a:ext cx="0" cy="0"/>
+          <a:chOff x="0" y="0"/>
+          <a:chExt cx="0" cy="0"/>
+        </a:xfrm>
+      </p:grpSpPr>
+      <p:sp>
+        <p:nvSpPr>
+          <p:cNvPr id="2" name="Title 1"/>
+          <p:cNvSpPr>
+            <a:spLocks noGrp="1"/>
+          </p:cNvSpPr>
+          <p:nvPr>
+            <p:ph type="title"/>
+          </p:nvPr>
+        </p:nvSpPr>
+        <p:spPr/>
+        <p:txBody>
+          <a:bodyPr/>
+          <a:lstStyle/>
+          <a:p>
+            <a:r>
+              <a:rPr lang="en-US" dirty="0"/>
+              <a:t>Enterprise Architecture Process</a:t>
+            </a:r>
+          </a:p>
+        </p:txBody>
+      </p:sp>
+      <p:sp>
+        <p:nvSpPr>
+          <p:cNvPr id="4" name="Footer Placeholder 3"/>
+          <p:cNvSpPr>
+            <a:spLocks noGrp="1"/>
+          </p:cNvSpPr>
+          <p:nvPr>
+            <p:ph type="ftr" sz="quarter" idx="10"/>
+          </p:nvPr>
+        </p:nvSpPr>
+        <p:spPr/>
+        <p:txBody>
+          <a:bodyPr/>
+          <a:lstStyle/>
+          <a:p>
+            <a:pPr>
+              <a:defRPr/>
+            </a:pPr>
             <a:r>
               <a:rPr lang="en-US" dirty="0" smtClean="0"/>
-              <a:t>ture @ Waterloo</a:t>
+              <a:t>Enterprise Architecture @ Waterloo</a:t>
             </a:r>
             <a:endParaRPr lang="en-US" dirty="0"/>
           </a:p>
@@ -24217,7 +24682,7 @@
 </p:sld>
 </file>
 
-<file path=ppt/slides/slide37.xml><?xml version="1.0" encoding="utf-8"?>
+<file path=ppt/slides/slide41.xml><?xml version="1.0" encoding="utf-8"?>
 <p:sld xmlns:a="http://schemas.openxmlformats.org/drawingml/2006/main" xmlns:r="http://schemas.openxmlformats.org/officeDocument/2006/relationships" xmlns:p="http://schemas.openxmlformats.org/presentationml/2006/main">
   <p:cSld>
     <p:spTree>
@@ -24332,7 +24797,7 @@
 </p:sld>
 </file>
 
-<file path=ppt/slides/slide38.xml><?xml version="1.0" encoding="utf-8"?>
+<file path=ppt/slides/slide42.xml><?xml version="1.0" encoding="utf-8"?>
 <p:sld xmlns:a="http://schemas.openxmlformats.org/drawingml/2006/main" xmlns:r="http://schemas.openxmlformats.org/officeDocument/2006/relationships" xmlns:p="http://schemas.openxmlformats.org/presentationml/2006/main">
   <p:cSld>
     <p:spTree>
@@ -24447,7 +24912,7 @@
 </p:sld>
 </file>
 
-<file path=ppt/slides/slide39.xml><?xml version="1.0" encoding="utf-8"?>
+<file path=ppt/slides/slide43.xml><?xml version="1.0" encoding="utf-8"?>
 <p:sld xmlns:a="http://schemas.openxmlformats.org/drawingml/2006/main" xmlns:r="http://schemas.openxmlformats.org/officeDocument/2006/relationships" xmlns:p="http://schemas.openxmlformats.org/presentationml/2006/main">
   <p:cSld>
     <p:spTree>
@@ -24557,138 +25022,7 @@
 </p:sld>
 </file>
 
-<file path=ppt/slides/slide4.xml><?xml version="1.0" encoding="utf-8"?>
-<p:sld xmlns:a="http://schemas.openxmlformats.org/drawingml/2006/main" xmlns:r="http://schemas.openxmlformats.org/officeDocument/2006/relationships" xmlns:p="http://schemas.openxmlformats.org/presentationml/2006/main">
-  <p:cSld>
-    <p:spTree>
-      <p:nvGrpSpPr>
-        <p:cNvPr id="1" name=""/>
-        <p:cNvGrpSpPr/>
-        <p:nvPr/>
-      </p:nvGrpSpPr>
-      <p:grpSpPr>
-        <a:xfrm>
-          <a:off x="0" y="0"/>
-          <a:ext cx="0" cy="0"/>
-          <a:chOff x="0" y="0"/>
-          <a:chExt cx="0" cy="0"/>
-        </a:xfrm>
-      </p:grpSpPr>
-      <p:sp>
-        <p:nvSpPr>
-          <p:cNvPr id="2" name="Title 1"/>
-          <p:cNvSpPr>
-            <a:spLocks noGrp="1"/>
-          </p:cNvSpPr>
-          <p:nvPr>
-            <p:ph type="title"/>
-          </p:nvPr>
-        </p:nvSpPr>
-        <p:spPr/>
-        <p:txBody>
-          <a:bodyPr/>
-          <a:lstStyle/>
-          <a:p>
-            <a:r>
-              <a:rPr lang="en-US" dirty="0" smtClean="0"/>
-              <a:t>Who – The enterprise architecture group</a:t>
-            </a:r>
-            <a:endParaRPr lang="en-US" dirty="0"/>
-          </a:p>
-        </p:txBody>
-      </p:sp>
-      <p:sp>
-        <p:nvSpPr>
-          <p:cNvPr id="3" name="Content Placeholder 2"/>
-          <p:cNvSpPr>
-            <a:spLocks noGrp="1"/>
-          </p:cNvSpPr>
-          <p:nvPr>
-            <p:ph idx="1"/>
-          </p:nvPr>
-        </p:nvSpPr>
-        <p:spPr/>
-        <p:txBody>
-          <a:bodyPr/>
-          <a:lstStyle/>
-          <a:p>
-            <a:r>
-              <a:rPr lang="en-US" dirty="0" smtClean="0"/>
-              <a:t>Mandate</a:t>
-            </a:r>
-          </a:p>
-          <a:p>
-            <a:pPr lvl="1"/>
-            <a:r>
-              <a:rPr lang="en-US" dirty="0" smtClean="0"/>
-              <a:t>The </a:t>
-            </a:r>
-            <a:r>
-              <a:rPr lang="en-US" dirty="0"/>
-              <a:t>mandate of this group is to </a:t>
-            </a:r>
-            <a:r>
-              <a:rPr lang="en-US" dirty="0">
-                <a:solidFill>
-                  <a:schemeClr val="tx1"/>
-                </a:solidFill>
-              </a:rPr>
-              <a:t>develop</a:t>
-            </a:r>
-            <a:r>
-              <a:rPr lang="en-US" dirty="0"/>
-              <a:t> the enterprise architecture strategy, framework and program for the university that addresses both current and future information management and information technology needs.</a:t>
-            </a:r>
-          </a:p>
-        </p:txBody>
-      </p:sp>
-      <p:sp>
-        <p:nvSpPr>
-          <p:cNvPr id="4" name="Footer Placeholder 3"/>
-          <p:cNvSpPr>
-            <a:spLocks noGrp="1"/>
-          </p:cNvSpPr>
-          <p:nvPr>
-            <p:ph type="ftr" sz="quarter" idx="10"/>
-          </p:nvPr>
-        </p:nvSpPr>
-        <p:spPr/>
-        <p:txBody>
-          <a:bodyPr/>
-          <a:lstStyle/>
-          <a:p>
-            <a:pPr>
-              <a:defRPr/>
-            </a:pPr>
-            <a:r>
-              <a:rPr lang="en-US" dirty="0" smtClean="0"/>
-              <a:t>Enterprise Architecture @ Waterloo</a:t>
-            </a:r>
-            <a:endParaRPr lang="en-US" dirty="0"/>
-          </a:p>
-        </p:txBody>
-      </p:sp>
-    </p:spTree>
-    <p:extLst>
-      <p:ext uri="{BB962C8B-B14F-4D97-AF65-F5344CB8AC3E}">
-        <p14:creationId xmlns:p14="http://schemas.microsoft.com/office/powerpoint/2010/main" val="1173392265"/>
-      </p:ext>
-    </p:extLst>
-  </p:cSld>
-  <p:clrMapOvr>
-    <a:masterClrMapping/>
-  </p:clrMapOvr>
-  <p:timing>
-    <p:tnLst>
-      <p:par>
-        <p:cTn id="1" dur="indefinite" restart="never" nodeType="tmRoot"/>
-      </p:par>
-    </p:tnLst>
-  </p:timing>
-</p:sld>
-</file>
-
-<file path=ppt/slides/slide40.xml><?xml version="1.0" encoding="utf-8"?>
+<file path=ppt/slides/slide44.xml><?xml version="1.0" encoding="utf-8"?>
 <p:sld xmlns:a="http://schemas.openxmlformats.org/drawingml/2006/main" xmlns:r="http://schemas.openxmlformats.org/officeDocument/2006/relationships" xmlns:p="http://schemas.openxmlformats.org/presentationml/2006/main">
   <p:cSld>
     <p:spTree>
@@ -24875,7 +25209,7 @@
 </p:sld>
 </file>
 
-<file path=ppt/slides/slide41.xml><?xml version="1.0" encoding="utf-8"?>
+<file path=ppt/slides/slide45.xml><?xml version="1.0" encoding="utf-8"?>
 <p:sld xmlns:a="http://schemas.openxmlformats.org/drawingml/2006/main" xmlns:r="http://schemas.openxmlformats.org/officeDocument/2006/relationships" xmlns:p="http://schemas.openxmlformats.org/presentationml/2006/main">
   <p:cSld>
     <p:spTree>
@@ -24917,11 +25251,7 @@
             <a:pPr algn="ctr"/>
             <a:r>
               <a:rPr lang="en-US" dirty="0" smtClean="0"/>
-              <a:t>WHERE</a:t>
-            </a:r>
-            <a:r>
-              <a:rPr lang="en-US" dirty="0" smtClean="0"/>
-              <a:t>?</a:t>
+              <a:t>WHERE?</a:t>
             </a:r>
             <a:br>
               <a:rPr lang="en-US" dirty="0" smtClean="0"/>
@@ -24971,637 +25301,6 @@
     <p:extLst>
       <p:ext uri="{BB962C8B-B14F-4D97-AF65-F5344CB8AC3E}">
         <p14:creationId xmlns:p14="http://schemas.microsoft.com/office/powerpoint/2010/main" val="3806824904"/>
-      </p:ext>
-    </p:extLst>
-  </p:cSld>
-  <p:clrMapOvr>
-    <a:masterClrMapping/>
-  </p:clrMapOvr>
-  <p:timing>
-    <p:tnLst>
-      <p:par>
-        <p:cTn id="1" dur="indefinite" restart="never" nodeType="tmRoot"/>
-      </p:par>
-    </p:tnLst>
-  </p:timing>
-</p:sld>
-</file>
-
-<file path=ppt/slides/slide42.xml><?xml version="1.0" encoding="utf-8"?>
-<p:sld xmlns:a="http://schemas.openxmlformats.org/drawingml/2006/main" xmlns:r="http://schemas.openxmlformats.org/officeDocument/2006/relationships" xmlns:p="http://schemas.openxmlformats.org/presentationml/2006/main">
-  <p:cSld>
-    <p:spTree>
-      <p:nvGrpSpPr>
-        <p:cNvPr id="1" name=""/>
-        <p:cNvGrpSpPr/>
-        <p:nvPr/>
-      </p:nvGrpSpPr>
-      <p:grpSpPr>
-        <a:xfrm>
-          <a:off x="0" y="0"/>
-          <a:ext cx="0" cy="0"/>
-          <a:chOff x="0" y="0"/>
-          <a:chExt cx="0" cy="0"/>
-        </a:xfrm>
-      </p:grpSpPr>
-      <p:sp>
-        <p:nvSpPr>
-          <p:cNvPr id="2" name="Title 1"/>
-          <p:cNvSpPr>
-            <a:spLocks noGrp="1"/>
-          </p:cNvSpPr>
-          <p:nvPr>
-            <p:ph type="title"/>
-          </p:nvPr>
-        </p:nvSpPr>
-        <p:spPr/>
-        <p:txBody>
-          <a:bodyPr/>
-          <a:lstStyle/>
-          <a:p>
-            <a:r>
-              <a:rPr lang="en-US" dirty="0" smtClean="0"/>
-              <a:t>Along Maturity Model-</a:t>
-            </a:r>
-            <a:br>
-              <a:rPr lang="en-US" dirty="0" smtClean="0"/>
-            </a:br>
-            <a:r>
-              <a:rPr lang="en-US" dirty="0" smtClean="0"/>
-              <a:t>Just starting.</a:t>
-            </a:r>
-            <a:endParaRPr lang="en-US" dirty="0"/>
-          </a:p>
-        </p:txBody>
-      </p:sp>
-      <p:sp>
-        <p:nvSpPr>
-          <p:cNvPr id="3" name="Content Placeholder 2"/>
-          <p:cNvSpPr>
-            <a:spLocks noGrp="1"/>
-          </p:cNvSpPr>
-          <p:nvPr>
-            <p:ph idx="1"/>
-          </p:nvPr>
-        </p:nvSpPr>
-        <p:spPr/>
-        <p:txBody>
-          <a:bodyPr/>
-          <a:lstStyle/>
-          <a:p>
-            <a:r>
-              <a:rPr lang="en-US" dirty="0" smtClean="0"/>
-              <a:t>Less than 1 year with full architecture team.</a:t>
-            </a:r>
-          </a:p>
-          <a:p>
-            <a:pPr lvl="1"/>
-            <a:r>
-              <a:rPr lang="en-US" dirty="0" smtClean="0"/>
-              <a:t>Foundational research amassed.</a:t>
-            </a:r>
-          </a:p>
-          <a:p>
-            <a:pPr lvl="1"/>
-            <a:r>
-              <a:rPr lang="en-US" dirty="0" smtClean="0"/>
-              <a:t>Preparing release of </a:t>
-            </a:r>
-            <a:r>
-              <a:rPr lang="en-US" i="1" dirty="0" smtClean="0"/>
-              <a:t>University of Waterloo Enterprise Architecture Framework</a:t>
-            </a:r>
-            <a:r>
-              <a:rPr lang="en-US" dirty="0" smtClean="0"/>
-              <a:t>.</a:t>
-            </a:r>
-          </a:p>
-          <a:p>
-            <a:pPr lvl="2"/>
-            <a:r>
-              <a:rPr lang="en-US" b="1" dirty="0" smtClean="0"/>
-              <a:t>Guide</a:t>
-            </a:r>
-            <a:r>
-              <a:rPr lang="en-US" dirty="0" smtClean="0"/>
-              <a:t> will provide the body of the University of Waterloo Enterprise Architecture Framework. Roles and responsibilities, definitions, etc.</a:t>
-            </a:r>
-          </a:p>
-          <a:p>
-            <a:pPr lvl="2"/>
-            <a:r>
-              <a:rPr lang="en-US" b="1" dirty="0" smtClean="0"/>
-              <a:t>Manual</a:t>
-            </a:r>
-            <a:r>
-              <a:rPr lang="en-US" dirty="0" smtClean="0"/>
-              <a:t> will provide easy-to-follow guidance for EA users and contributors.</a:t>
-            </a:r>
-          </a:p>
-          <a:p>
-            <a:pPr lvl="2"/>
-            <a:r>
-              <a:rPr lang="en-US" b="1" dirty="0" smtClean="0"/>
-              <a:t>Book</a:t>
-            </a:r>
-            <a:r>
-              <a:rPr lang="en-US" dirty="0" smtClean="0"/>
-              <a:t> will provide background research and lessons learned guidance to others attempting to develop a hybrid Enterprise Architecture Framework in their own enterprises.</a:t>
-            </a:r>
-          </a:p>
-          <a:p>
-            <a:pPr lvl="2"/>
-            <a:endParaRPr lang="en-US" dirty="0"/>
-          </a:p>
-        </p:txBody>
-      </p:sp>
-      <p:sp>
-        <p:nvSpPr>
-          <p:cNvPr id="4" name="Footer Placeholder 3"/>
-          <p:cNvSpPr>
-            <a:spLocks noGrp="1"/>
-          </p:cNvSpPr>
-          <p:nvPr>
-            <p:ph type="ftr" sz="quarter" idx="10"/>
-          </p:nvPr>
-        </p:nvSpPr>
-        <p:spPr/>
-        <p:txBody>
-          <a:bodyPr/>
-          <a:lstStyle/>
-          <a:p>
-            <a:pPr>
-              <a:defRPr/>
-            </a:pPr>
-            <a:r>
-              <a:rPr lang="en-US" dirty="0" smtClean="0"/>
-              <a:t>Enterprise Architecture @ Waterloo</a:t>
-            </a:r>
-            <a:endParaRPr lang="en-US" dirty="0"/>
-          </a:p>
-        </p:txBody>
-      </p:sp>
-    </p:spTree>
-    <p:extLst>
-      <p:ext uri="{BB962C8B-B14F-4D97-AF65-F5344CB8AC3E}">
-        <p14:creationId xmlns:p14="http://schemas.microsoft.com/office/powerpoint/2010/main" val="990515279"/>
-      </p:ext>
-    </p:extLst>
-  </p:cSld>
-  <p:clrMapOvr>
-    <a:masterClrMapping/>
-  </p:clrMapOvr>
-  <p:timing>
-    <p:tnLst>
-      <p:par>
-        <p:cTn id="1" dur="indefinite" restart="never" nodeType="tmRoot"/>
-      </p:par>
-    </p:tnLst>
-  </p:timing>
-</p:sld>
-</file>
-
-<file path=ppt/slides/slide43.xml><?xml version="1.0" encoding="utf-8"?>
-<p:sld xmlns:a="http://schemas.openxmlformats.org/drawingml/2006/main" xmlns:r="http://schemas.openxmlformats.org/officeDocument/2006/relationships" xmlns:p="http://schemas.openxmlformats.org/presentationml/2006/main">
-  <p:cSld>
-    <p:spTree>
-      <p:nvGrpSpPr>
-        <p:cNvPr id="1" name=""/>
-        <p:cNvGrpSpPr/>
-        <p:nvPr/>
-      </p:nvGrpSpPr>
-      <p:grpSpPr>
-        <a:xfrm>
-          <a:off x="0" y="0"/>
-          <a:ext cx="0" cy="0"/>
-          <a:chOff x="0" y="0"/>
-          <a:chExt cx="0" cy="0"/>
-        </a:xfrm>
-      </p:grpSpPr>
-      <p:sp>
-        <p:nvSpPr>
-          <p:cNvPr id="2" name="Title 1"/>
-          <p:cNvSpPr>
-            <a:spLocks noGrp="1"/>
-          </p:cNvSpPr>
-          <p:nvPr>
-            <p:ph type="title"/>
-          </p:nvPr>
-        </p:nvSpPr>
-        <p:spPr/>
-        <p:txBody>
-          <a:bodyPr/>
-          <a:lstStyle/>
-          <a:p>
-            <a:r>
-              <a:rPr lang="en-US" dirty="0" smtClean="0"/>
-              <a:t>Along Maturity Model-</a:t>
-            </a:r>
-            <a:br>
-              <a:rPr lang="en-US" dirty="0" smtClean="0"/>
-            </a:br>
-            <a:r>
-              <a:rPr lang="en-US" dirty="0" smtClean="0"/>
-              <a:t>Building required skills.</a:t>
-            </a:r>
-            <a:endParaRPr lang="en-US" dirty="0"/>
-          </a:p>
-        </p:txBody>
-      </p:sp>
-      <p:sp>
-        <p:nvSpPr>
-          <p:cNvPr id="3" name="Content Placeholder 2"/>
-          <p:cNvSpPr>
-            <a:spLocks noGrp="1"/>
-          </p:cNvSpPr>
-          <p:nvPr>
-            <p:ph idx="1"/>
-          </p:nvPr>
-        </p:nvSpPr>
-        <p:spPr/>
-        <p:txBody>
-          <a:bodyPr/>
-          <a:lstStyle/>
-          <a:p>
-            <a:r>
-              <a:rPr lang="en-US" dirty="0" smtClean="0"/>
-              <a:t>Developing Enterprise Information Management (EIM) capability to augment EA.</a:t>
-            </a:r>
-          </a:p>
-          <a:p>
-            <a:pPr lvl="1"/>
-            <a:r>
-              <a:rPr lang="en-US" dirty="0" smtClean="0"/>
-              <a:t>Enterprise Data Management (EDM)</a:t>
-            </a:r>
-          </a:p>
-          <a:p>
-            <a:pPr lvl="2"/>
-            <a:r>
-              <a:rPr lang="en-US" dirty="0" smtClean="0"/>
-              <a:t>Business Intelligence</a:t>
-            </a:r>
-          </a:p>
-          <a:p>
-            <a:pPr lvl="2"/>
-            <a:r>
-              <a:rPr lang="en-US" dirty="0" smtClean="0"/>
-              <a:t>Data Warehousing</a:t>
-            </a:r>
-          </a:p>
-          <a:p>
-            <a:pPr lvl="2"/>
-            <a:r>
-              <a:rPr lang="en-US" dirty="0" smtClean="0"/>
-              <a:t>Data Definitions</a:t>
-            </a:r>
-          </a:p>
-          <a:p>
-            <a:pPr lvl="2"/>
-            <a:r>
-              <a:rPr lang="en-US" dirty="0" smtClean="0"/>
-              <a:t>Data Access</a:t>
-            </a:r>
-          </a:p>
-          <a:p>
-            <a:pPr lvl="1"/>
-            <a:r>
-              <a:rPr lang="en-US" dirty="0" smtClean="0"/>
-              <a:t>Enterprise Content Management (ECM)</a:t>
-            </a:r>
-          </a:p>
-          <a:p>
-            <a:pPr lvl="2"/>
-            <a:r>
-              <a:rPr lang="en-US" dirty="0" smtClean="0"/>
-              <a:t>Document and Records Management</a:t>
-            </a:r>
-          </a:p>
-          <a:p>
-            <a:pPr lvl="2"/>
-            <a:r>
-              <a:rPr lang="en-US" dirty="0" smtClean="0"/>
-              <a:t>Standards and Procedures</a:t>
-            </a:r>
-          </a:p>
-          <a:p>
-            <a:pPr lvl="1"/>
-            <a:endParaRPr lang="en-US" dirty="0"/>
-          </a:p>
-        </p:txBody>
-      </p:sp>
-      <p:sp>
-        <p:nvSpPr>
-          <p:cNvPr id="4" name="Footer Placeholder 3"/>
-          <p:cNvSpPr>
-            <a:spLocks noGrp="1"/>
-          </p:cNvSpPr>
-          <p:nvPr>
-            <p:ph type="ftr" sz="quarter" idx="10"/>
-          </p:nvPr>
-        </p:nvSpPr>
-        <p:spPr/>
-        <p:txBody>
-          <a:bodyPr/>
-          <a:lstStyle/>
-          <a:p>
-            <a:pPr>
-              <a:defRPr/>
-            </a:pPr>
-            <a:r>
-              <a:rPr lang="en-US" dirty="0" smtClean="0"/>
-              <a:t>Enterprise Architecture @ Waterloo</a:t>
-            </a:r>
-            <a:endParaRPr lang="en-US" dirty="0"/>
-          </a:p>
-        </p:txBody>
-      </p:sp>
-    </p:spTree>
-    <p:extLst>
-      <p:ext uri="{BB962C8B-B14F-4D97-AF65-F5344CB8AC3E}">
-        <p14:creationId xmlns:p14="http://schemas.microsoft.com/office/powerpoint/2010/main" val="2064625545"/>
-      </p:ext>
-    </p:extLst>
-  </p:cSld>
-  <p:clrMapOvr>
-    <a:masterClrMapping/>
-  </p:clrMapOvr>
-  <p:timing>
-    <p:tnLst>
-      <p:par>
-        <p:cTn id="1" dur="indefinite" restart="never" nodeType="tmRoot"/>
-      </p:par>
-    </p:tnLst>
-  </p:timing>
-</p:sld>
-</file>
-
-<file path=ppt/slides/slide44.xml><?xml version="1.0" encoding="utf-8"?>
-<p:sld xmlns:a="http://schemas.openxmlformats.org/drawingml/2006/main" xmlns:r="http://schemas.openxmlformats.org/officeDocument/2006/relationships" xmlns:p="http://schemas.openxmlformats.org/presentationml/2006/main">
-  <p:cSld>
-    <p:spTree>
-      <p:nvGrpSpPr>
-        <p:cNvPr id="1" name=""/>
-        <p:cNvGrpSpPr/>
-        <p:nvPr/>
-      </p:nvGrpSpPr>
-      <p:grpSpPr>
-        <a:xfrm>
-          <a:off x="0" y="0"/>
-          <a:ext cx="0" cy="0"/>
-          <a:chOff x="0" y="0"/>
-          <a:chExt cx="0" cy="0"/>
-        </a:xfrm>
-      </p:grpSpPr>
-      <p:sp>
-        <p:nvSpPr>
-          <p:cNvPr id="2" name="Title 1"/>
-          <p:cNvSpPr>
-            <a:spLocks noGrp="1"/>
-          </p:cNvSpPr>
-          <p:nvPr>
-            <p:ph type="title"/>
-          </p:nvPr>
-        </p:nvSpPr>
-        <p:spPr/>
-        <p:txBody>
-          <a:bodyPr/>
-          <a:lstStyle/>
-          <a:p>
-            <a:r>
-              <a:rPr lang="en-US" dirty="0" smtClean="0"/>
-              <a:t>Project Involvement –</a:t>
-            </a:r>
-            <a:br>
-              <a:rPr lang="en-US" dirty="0" smtClean="0"/>
-            </a:br>
-            <a:r>
-              <a:rPr lang="en-US" dirty="0" smtClean="0"/>
-              <a:t>Architecture</a:t>
-            </a:r>
-            <a:endParaRPr lang="en-US" dirty="0"/>
-          </a:p>
-        </p:txBody>
-      </p:sp>
-      <p:sp>
-        <p:nvSpPr>
-          <p:cNvPr id="3" name="Content Placeholder 2"/>
-          <p:cNvSpPr>
-            <a:spLocks noGrp="1"/>
-          </p:cNvSpPr>
-          <p:nvPr>
-            <p:ph idx="1"/>
-          </p:nvPr>
-        </p:nvSpPr>
-        <p:spPr/>
-        <p:txBody>
-          <a:bodyPr anchor="ctr"/>
-          <a:lstStyle/>
-          <a:p>
-            <a:r>
-              <a:rPr lang="en-US" dirty="0" smtClean="0"/>
-              <a:t>Finance Implementation</a:t>
-            </a:r>
-          </a:p>
-          <a:p>
-            <a:pPr marL="457200" lvl="1" indent="0">
-              <a:buNone/>
-            </a:pPr>
-            <a:endParaRPr lang="en-US" dirty="0" smtClean="0"/>
-          </a:p>
-          <a:p>
-            <a:r>
-              <a:rPr lang="en-US" dirty="0" smtClean="0"/>
-              <a:t>HR Re-Implementation</a:t>
-            </a:r>
-          </a:p>
-          <a:p>
-            <a:endParaRPr lang="en-US" dirty="0"/>
-          </a:p>
-          <a:p>
-            <a:r>
-              <a:rPr lang="en-US" dirty="0" smtClean="0"/>
-              <a:t>WCMS ‘full-stack’ review</a:t>
-            </a:r>
-          </a:p>
-          <a:p>
-            <a:endParaRPr lang="en-US" dirty="0"/>
-          </a:p>
-          <a:p>
-            <a:r>
-              <a:rPr lang="en-US" dirty="0" smtClean="0"/>
-              <a:t>Business Architecture Pilot</a:t>
-            </a:r>
-          </a:p>
-        </p:txBody>
-      </p:sp>
-      <p:sp>
-        <p:nvSpPr>
-          <p:cNvPr id="4" name="Footer Placeholder 3"/>
-          <p:cNvSpPr>
-            <a:spLocks noGrp="1"/>
-          </p:cNvSpPr>
-          <p:nvPr>
-            <p:ph type="ftr" sz="quarter" idx="10"/>
-          </p:nvPr>
-        </p:nvSpPr>
-        <p:spPr/>
-        <p:txBody>
-          <a:bodyPr/>
-          <a:lstStyle/>
-          <a:p>
-            <a:pPr>
-              <a:defRPr/>
-            </a:pPr>
-            <a:r>
-              <a:rPr lang="en-US" dirty="0" smtClean="0"/>
-              <a:t>Enterprise Architecture @ Waterloo</a:t>
-            </a:r>
-            <a:endParaRPr lang="en-US" dirty="0"/>
-          </a:p>
-        </p:txBody>
-      </p:sp>
-    </p:spTree>
-    <p:extLst>
-      <p:ext uri="{BB962C8B-B14F-4D97-AF65-F5344CB8AC3E}">
-        <p14:creationId xmlns:p14="http://schemas.microsoft.com/office/powerpoint/2010/main" val="3586137305"/>
-      </p:ext>
-    </p:extLst>
-  </p:cSld>
-  <p:clrMapOvr>
-    <a:masterClrMapping/>
-  </p:clrMapOvr>
-  <p:timing>
-    <p:tnLst>
-      <p:par>
-        <p:cTn id="1" dur="indefinite" restart="never" nodeType="tmRoot"/>
-      </p:par>
-    </p:tnLst>
-  </p:timing>
-</p:sld>
-</file>
-
-<file path=ppt/slides/slide45.xml><?xml version="1.0" encoding="utf-8"?>
-<p:sld xmlns:a="http://schemas.openxmlformats.org/drawingml/2006/main" xmlns:r="http://schemas.openxmlformats.org/officeDocument/2006/relationships" xmlns:p="http://schemas.openxmlformats.org/presentationml/2006/main">
-  <p:cSld>
-    <p:spTree>
-      <p:nvGrpSpPr>
-        <p:cNvPr id="1" name=""/>
-        <p:cNvGrpSpPr/>
-        <p:nvPr/>
-      </p:nvGrpSpPr>
-      <p:grpSpPr>
-        <a:xfrm>
-          <a:off x="0" y="0"/>
-          <a:ext cx="0" cy="0"/>
-          <a:chOff x="0" y="0"/>
-          <a:chExt cx="0" cy="0"/>
-        </a:xfrm>
-      </p:grpSpPr>
-      <p:sp>
-        <p:nvSpPr>
-          <p:cNvPr id="2" name="Title 1"/>
-          <p:cNvSpPr>
-            <a:spLocks noGrp="1"/>
-          </p:cNvSpPr>
-          <p:nvPr>
-            <p:ph type="title"/>
-          </p:nvPr>
-        </p:nvSpPr>
-        <p:spPr/>
-        <p:txBody>
-          <a:bodyPr/>
-          <a:lstStyle/>
-          <a:p>
-            <a:r>
-              <a:rPr lang="en-US" dirty="0" smtClean="0"/>
-              <a:t>Project Involvement –</a:t>
-            </a:r>
-            <a:br>
-              <a:rPr lang="en-US" dirty="0" smtClean="0"/>
-            </a:br>
-            <a:r>
-              <a:rPr lang="en-US" dirty="0" smtClean="0"/>
-              <a:t>Strategic Innovations</a:t>
-            </a:r>
-            <a:endParaRPr lang="en-US" dirty="0"/>
-          </a:p>
-        </p:txBody>
-      </p:sp>
-      <p:sp>
-        <p:nvSpPr>
-          <p:cNvPr id="3" name="Content Placeholder 2"/>
-          <p:cNvSpPr>
-            <a:spLocks noGrp="1"/>
-          </p:cNvSpPr>
-          <p:nvPr>
-            <p:ph idx="1"/>
-          </p:nvPr>
-        </p:nvSpPr>
-        <p:spPr/>
-        <p:txBody>
-          <a:bodyPr anchor="ctr"/>
-          <a:lstStyle/>
-          <a:p>
-            <a:r>
-              <a:rPr lang="en-US" dirty="0" err="1" smtClean="0"/>
-              <a:t>WatCACE</a:t>
-            </a:r>
-            <a:r>
-              <a:rPr lang="en-US" dirty="0" smtClean="0"/>
-              <a:t> Research Portal</a:t>
-            </a:r>
-          </a:p>
-          <a:p>
-            <a:endParaRPr lang="en-US" dirty="0"/>
-          </a:p>
-          <a:p>
-            <a:r>
-              <a:rPr lang="en-US" dirty="0" smtClean="0"/>
-              <a:t>Policy 73 IP Metrics</a:t>
-            </a:r>
-          </a:p>
-          <a:p>
-            <a:endParaRPr lang="en-US" dirty="0"/>
-          </a:p>
-          <a:p>
-            <a:r>
-              <a:rPr lang="en-US" dirty="0" smtClean="0"/>
-              <a:t>JIRA / Confluence Experimentation</a:t>
-            </a:r>
-          </a:p>
-        </p:txBody>
-      </p:sp>
-      <p:sp>
-        <p:nvSpPr>
-          <p:cNvPr id="4" name="Footer Placeholder 3"/>
-          <p:cNvSpPr>
-            <a:spLocks noGrp="1"/>
-          </p:cNvSpPr>
-          <p:nvPr>
-            <p:ph type="ftr" sz="quarter" idx="10"/>
-          </p:nvPr>
-        </p:nvSpPr>
-        <p:spPr/>
-        <p:txBody>
-          <a:bodyPr/>
-          <a:lstStyle/>
-          <a:p>
-            <a:pPr>
-              <a:defRPr/>
-            </a:pPr>
-            <a:r>
-              <a:rPr lang="en-US" dirty="0" smtClean="0"/>
-              <a:t>Enterprise Architecture @ Waterloo</a:t>
-            </a:r>
-            <a:endParaRPr lang="en-US" dirty="0"/>
-          </a:p>
-        </p:txBody>
-      </p:sp>
-    </p:spTree>
-    <p:extLst>
-      <p:ext uri="{BB962C8B-B14F-4D97-AF65-F5344CB8AC3E}">
-        <p14:creationId xmlns:p14="http://schemas.microsoft.com/office/powerpoint/2010/main" val="702435405"/>
       </p:ext>
     </p:extLst>
   </p:cSld>
@@ -25652,14 +25351,14 @@
           <a:p>
             <a:r>
               <a:rPr lang="en-US" dirty="0" smtClean="0"/>
-              <a:t>Project Involvement –</a:t>
+              <a:t>Along Maturity Model-</a:t>
             </a:r>
             <a:br>
               <a:rPr lang="en-US" dirty="0" smtClean="0"/>
             </a:br>
             <a:r>
               <a:rPr lang="en-US" dirty="0" smtClean="0"/>
-              <a:t>INTEGRATIONS</a:t>
+              <a:t>Just starting.</a:t>
             </a:r>
             <a:endParaRPr lang="en-US" dirty="0"/>
           </a:p>
@@ -25677,32 +25376,72 @@
         </p:nvSpPr>
         <p:spPr/>
         <p:txBody>
-          <a:bodyPr anchor="ctr"/>
+          <a:bodyPr/>
           <a:lstStyle/>
           <a:p>
             <a:r>
               <a:rPr lang="en-US" dirty="0" smtClean="0"/>
-              <a:t>HR / Finance Integration Normalization</a:t>
-            </a:r>
-          </a:p>
-          <a:p>
+              <a:t>Less than 1 year with full architecture team.</a:t>
+            </a:r>
+          </a:p>
+          <a:p>
+            <a:pPr lvl="1"/>
+            <a:r>
+              <a:rPr lang="en-US" dirty="0" smtClean="0"/>
+              <a:t>Foundational research amassed.</a:t>
+            </a:r>
+          </a:p>
+          <a:p>
+            <a:pPr lvl="1"/>
+            <a:r>
+              <a:rPr lang="en-US" dirty="0" smtClean="0"/>
+              <a:t>Preparing release of </a:t>
+            </a:r>
+            <a:r>
+              <a:rPr lang="en-US" i="1" dirty="0" smtClean="0"/>
+              <a:t>University of Waterloo Enterprise Architecture Framework</a:t>
+            </a:r>
+            <a:r>
+              <a:rPr lang="en-US" dirty="0" smtClean="0"/>
+              <a:t>.</a:t>
+            </a:r>
+          </a:p>
+          <a:p>
+            <a:pPr lvl="2"/>
+            <a:r>
+              <a:rPr lang="en-US" b="1" dirty="0" smtClean="0"/>
+              <a:t>Guide</a:t>
+            </a:r>
+            <a:r>
+              <a:rPr lang="en-US" dirty="0" smtClean="0"/>
+              <a:t> will provide the body of the University of Waterloo Enterprise Architecture Framework. Roles and responsibilities, definitions, etc.</a:t>
+            </a:r>
+          </a:p>
+          <a:p>
+            <a:pPr lvl="2"/>
+            <a:r>
+              <a:rPr lang="en-US" b="1" dirty="0" smtClean="0"/>
+              <a:t>Manual</a:t>
+            </a:r>
+            <a:r>
+              <a:rPr lang="en-US" dirty="0" smtClean="0"/>
+              <a:t> will provide easy-to-follow guidance for EA users and contributors.</a:t>
+            </a:r>
+          </a:p>
+          <a:p>
+            <a:pPr lvl="2"/>
+            <a:r>
+              <a:rPr lang="en-US" b="1" dirty="0" smtClean="0"/>
+              <a:t>Book</a:t>
+            </a:r>
+            <a:r>
+              <a:rPr lang="en-US" dirty="0" smtClean="0"/>
+              <a:t> will provide background research and lessons learned guidance to others attempting to develop a hybrid Enterprise Architecture Framework in their own enterprises.</a:t>
+            </a:r>
+          </a:p>
+          <a:p>
+            <a:pPr lvl="2"/>
             <a:endParaRPr lang="en-US" dirty="0"/>
-          </a:p>
-          <a:p>
-            <a:r>
-              <a:rPr lang="en-US" dirty="0" smtClean="0"/>
-              <a:t>Developing API Capabilities</a:t>
-            </a:r>
-            <a:endParaRPr lang="en-US" dirty="0"/>
-          </a:p>
-          <a:p>
-            <a:endParaRPr lang="en-US" dirty="0" smtClean="0"/>
-          </a:p>
-          <a:p>
-            <a:r>
-              <a:rPr lang="en-US" dirty="0" smtClean="0"/>
-              <a:t>Warehousing Student Data (QUEST)</a:t>
-            </a:r>
           </a:p>
         </p:txBody>
       </p:sp>
@@ -25735,7 +25474,7 @@
     </p:spTree>
     <p:extLst>
       <p:ext uri="{BB962C8B-B14F-4D97-AF65-F5344CB8AC3E}">
-        <p14:creationId xmlns:p14="http://schemas.microsoft.com/office/powerpoint/2010/main" val="772917458"/>
+        <p14:creationId xmlns:p14="http://schemas.microsoft.com/office/powerpoint/2010/main" val="990515279"/>
       </p:ext>
     </p:extLst>
   </p:cSld>
@@ -25779,37 +25518,104 @@
             <p:ph type="title"/>
           </p:nvPr>
         </p:nvSpPr>
-        <p:spPr>
-          <a:xfrm>
-            <a:off x="457200" y="2492520"/>
-            <a:ext cx="8229600" cy="1143000"/>
-          </a:xfrm>
-        </p:spPr>
+        <p:spPr/>
         <p:txBody>
-          <a:bodyPr>
-            <a:normAutofit fontScale="90000"/>
-          </a:bodyPr>
+          <a:bodyPr/>
           <a:lstStyle/>
           <a:p>
-            <a:pPr algn="ctr"/>
             <a:r>
               <a:rPr lang="en-US" dirty="0" smtClean="0"/>
-              <a:t>When?</a:t>
+              <a:t>Along Maturity Model-</a:t>
             </a:r>
             <a:br>
               <a:rPr lang="en-US" dirty="0" smtClean="0"/>
             </a:br>
             <a:r>
-              <a:rPr lang="en-US" dirty="0"/>
-              <a:t/>
-            </a:r>
-            <a:br>
-              <a:rPr lang="en-US" dirty="0"/>
-            </a:br>
-            <a:r>
               <a:rPr lang="en-US" dirty="0" smtClean="0"/>
-              <a:t>Can you get involved</a:t>
-            </a:r>
+              <a:t>Building required skills.</a:t>
+            </a:r>
+            <a:endParaRPr lang="en-US" dirty="0"/>
+          </a:p>
+        </p:txBody>
+      </p:sp>
+      <p:sp>
+        <p:nvSpPr>
+          <p:cNvPr id="3" name="Content Placeholder 2"/>
+          <p:cNvSpPr>
+            <a:spLocks noGrp="1"/>
+          </p:cNvSpPr>
+          <p:nvPr>
+            <p:ph idx="1"/>
+          </p:nvPr>
+        </p:nvSpPr>
+        <p:spPr/>
+        <p:txBody>
+          <a:bodyPr/>
+          <a:lstStyle/>
+          <a:p>
+            <a:r>
+              <a:rPr lang="en-US" dirty="0" smtClean="0"/>
+              <a:t>Developing Enterprise Information Management (EIM) capability to augment EA.</a:t>
+            </a:r>
+          </a:p>
+          <a:p>
+            <a:pPr lvl="1"/>
+            <a:r>
+              <a:rPr lang="en-US" dirty="0" smtClean="0"/>
+              <a:t>Enterprise Data Management (EDM)</a:t>
+            </a:r>
+          </a:p>
+          <a:p>
+            <a:pPr lvl="2"/>
+            <a:r>
+              <a:rPr lang="en-US" dirty="0" smtClean="0"/>
+              <a:t>Business Intelligence</a:t>
+            </a:r>
+          </a:p>
+          <a:p>
+            <a:pPr lvl="2"/>
+            <a:r>
+              <a:rPr lang="en-US" dirty="0" smtClean="0"/>
+              <a:t>Data Warehousing</a:t>
+            </a:r>
+          </a:p>
+          <a:p>
+            <a:pPr lvl="2"/>
+            <a:r>
+              <a:rPr lang="en-US" dirty="0" smtClean="0"/>
+              <a:t>Data Definitions</a:t>
+            </a:r>
+          </a:p>
+          <a:p>
+            <a:pPr lvl="2"/>
+            <a:r>
+              <a:rPr lang="en-US" dirty="0" smtClean="0"/>
+              <a:t>Data Access</a:t>
+            </a:r>
+          </a:p>
+          <a:p>
+            <a:pPr lvl="1"/>
+            <a:r>
+              <a:rPr lang="en-US" dirty="0" smtClean="0"/>
+              <a:t>Enterprise Content Management (ECM)</a:t>
+            </a:r>
+          </a:p>
+          <a:p>
+            <a:pPr lvl="2"/>
+            <a:r>
+              <a:rPr lang="en-US" dirty="0" smtClean="0"/>
+              <a:t>Document and Records Management</a:t>
+            </a:r>
+          </a:p>
+          <a:p>
+            <a:pPr lvl="2"/>
+            <a:r>
+              <a:rPr lang="en-US" dirty="0" smtClean="0"/>
+              <a:t>Standards and Procedures</a:t>
+            </a:r>
+          </a:p>
+          <a:p>
+            <a:pPr lvl="1"/>
             <a:endParaRPr lang="en-US" dirty="0"/>
           </a:p>
         </p:txBody>
@@ -25843,7 +25649,7 @@
     </p:spTree>
     <p:extLst>
       <p:ext uri="{BB962C8B-B14F-4D97-AF65-F5344CB8AC3E}">
-        <p14:creationId xmlns:p14="http://schemas.microsoft.com/office/powerpoint/2010/main" val="1296925850"/>
+        <p14:creationId xmlns:p14="http://schemas.microsoft.com/office/powerpoint/2010/main" val="2064625545"/>
       </p:ext>
     </p:extLst>
   </p:cSld>
@@ -25894,7 +25700,14 @@
           <a:p>
             <a:r>
               <a:rPr lang="en-US" dirty="0" smtClean="0"/>
-              <a:t>Get involved NOW!</a:t>
+              <a:t>Project Involvement –</a:t>
+            </a:r>
+            <a:br>
+              <a:rPr lang="en-US" dirty="0" smtClean="0"/>
+            </a:br>
+            <a:r>
+              <a:rPr lang="en-US" dirty="0" smtClean="0"/>
+              <a:t>Architecture</a:t>
             </a:r>
             <a:endParaRPr lang="en-US" dirty="0"/>
           </a:p>
@@ -25912,12 +25725,24 @@
         </p:nvSpPr>
         <p:spPr/>
         <p:txBody>
-          <a:bodyPr/>
+          <a:bodyPr anchor="ctr"/>
           <a:lstStyle/>
           <a:p>
             <a:r>
               <a:rPr lang="en-US" dirty="0" smtClean="0"/>
-              <a:t>Many of you are creating architecture artifacts today.</a:t>
+              <a:t>Finance Implementation</a:t>
+            </a:r>
+          </a:p>
+          <a:p>
+            <a:pPr marL="457200" lvl="1" indent="0">
+              <a:buNone/>
+            </a:pPr>
+            <a:endParaRPr lang="en-US" dirty="0" smtClean="0"/>
+          </a:p>
+          <a:p>
+            <a:r>
+              <a:rPr lang="en-US" dirty="0" smtClean="0"/>
+              <a:t>HR Re-Implementation</a:t>
             </a:r>
           </a:p>
           <a:p>
@@ -25926,7 +25751,7 @@
           <a:p>
             <a:r>
               <a:rPr lang="en-US" dirty="0" smtClean="0"/>
-              <a:t>The EA team needs to know about your work to begin understanding how to leverage it towards a ‘strategic information asset base.’</a:t>
+              <a:t>WCMS ‘full-stack’ review</a:t>
             </a:r>
           </a:p>
           <a:p>
@@ -25935,14 +25760,8 @@
           <a:p>
             <a:r>
               <a:rPr lang="en-US" dirty="0" smtClean="0"/>
-              <a:t>We are archeologists, ethnographers, and documenters.  You are the designers!</a:t>
-            </a:r>
-          </a:p>
-          <a:p>
-            <a:endParaRPr lang="en-US" dirty="0"/>
-          </a:p>
-          <a:p>
-            <a:endParaRPr lang="en-US" dirty="0"/>
+              <a:t>Business Architecture Pilot</a:t>
+            </a:r>
           </a:p>
         </p:txBody>
       </p:sp>
@@ -25975,7 +25794,7 @@
     </p:spTree>
     <p:extLst>
       <p:ext uri="{BB962C8B-B14F-4D97-AF65-F5344CB8AC3E}">
-        <p14:creationId xmlns:p14="http://schemas.microsoft.com/office/powerpoint/2010/main" val="1127070848"/>
+        <p14:creationId xmlns:p14="http://schemas.microsoft.com/office/powerpoint/2010/main" val="3586137305"/>
       </p:ext>
     </p:extLst>
   </p:cSld>
@@ -26021,19 +25840,65 @@
         </p:nvSpPr>
         <p:spPr/>
         <p:txBody>
-          <a:bodyPr>
-            <a:normAutofit fontScale="90000"/>
-          </a:bodyPr>
+          <a:bodyPr/>
           <a:lstStyle/>
           <a:p>
             <a:r>
               <a:rPr lang="en-US" dirty="0" smtClean="0"/>
-              <a:t>Where do you have expertise?</a:t>
+              <a:t>Project Involvement –</a:t>
             </a:r>
             <a:br>
               <a:rPr lang="en-US" dirty="0" smtClean="0"/>
             </a:br>
+            <a:r>
+              <a:rPr lang="en-US" dirty="0" smtClean="0"/>
+              <a:t>Strategic Innovations</a:t>
+            </a:r>
             <a:endParaRPr lang="en-US" dirty="0"/>
+          </a:p>
+        </p:txBody>
+      </p:sp>
+      <p:sp>
+        <p:nvSpPr>
+          <p:cNvPr id="3" name="Content Placeholder 2"/>
+          <p:cNvSpPr>
+            <a:spLocks noGrp="1"/>
+          </p:cNvSpPr>
+          <p:nvPr>
+            <p:ph idx="1"/>
+          </p:nvPr>
+        </p:nvSpPr>
+        <p:spPr/>
+        <p:txBody>
+          <a:bodyPr anchor="ctr"/>
+          <a:lstStyle/>
+          <a:p>
+            <a:r>
+              <a:rPr lang="en-US" dirty="0" err="1" smtClean="0"/>
+              <a:t>WatCACE</a:t>
+            </a:r>
+            <a:r>
+              <a:rPr lang="en-US" dirty="0" smtClean="0"/>
+              <a:t> Research Portal</a:t>
+            </a:r>
+          </a:p>
+          <a:p>
+            <a:endParaRPr lang="en-US" dirty="0"/>
+          </a:p>
+          <a:p>
+            <a:r>
+              <a:rPr lang="en-US" dirty="0" smtClean="0"/>
+              <a:t>Policy 73 IP Metrics</a:t>
+            </a:r>
+          </a:p>
+          <a:p>
+            <a:endParaRPr lang="en-US" dirty="0"/>
+          </a:p>
+          <a:p>
+            <a:r>
+              <a:rPr lang="en-US" dirty="0" smtClean="0"/>
+              <a:t>JIRA / Confluence Experimentation</a:t>
+            </a:r>
           </a:p>
         </p:txBody>
       </p:sp>
@@ -26063,34 +25928,10 @@
           </a:p>
         </p:txBody>
       </p:sp>
-      <p:pic>
-        <p:nvPicPr>
-          <p:cNvPr id="5" name="Picture 4"/>
-          <p:cNvPicPr>
-            <a:picLocks noChangeAspect="1"/>
-          </p:cNvPicPr>
-          <p:nvPr/>
-        </p:nvPicPr>
-        <p:blipFill>
-          <a:blip r:embed="rId3"/>
-          <a:stretch>
-            <a:fillRect/>
-          </a:stretch>
-        </p:blipFill>
-        <p:spPr>
-          <a:xfrm>
-            <a:off x="1803400" y="1330285"/>
-            <a:ext cx="5537200" cy="3479800"/>
-          </a:xfrm>
-          <a:prstGeom prst="rect">
-            <a:avLst/>
-          </a:prstGeom>
-        </p:spPr>
-      </p:pic>
     </p:spTree>
     <p:extLst>
       <p:ext uri="{BB962C8B-B14F-4D97-AF65-F5344CB8AC3E}">
-        <p14:creationId xmlns:p14="http://schemas.microsoft.com/office/powerpoint/2010/main" val="121871606"/>
+        <p14:creationId xmlns:p14="http://schemas.microsoft.com/office/powerpoint/2010/main" val="702435405"/>
       </p:ext>
     </p:extLst>
   </p:cSld>
@@ -26296,7 +26137,14 @@
           <a:p>
             <a:r>
               <a:rPr lang="en-US" dirty="0" smtClean="0"/>
-              <a:t>We are ready when you are!</a:t>
+              <a:t>Project Involvement –</a:t>
+            </a:r>
+            <a:br>
+              <a:rPr lang="en-US" dirty="0" smtClean="0"/>
+            </a:br>
+            <a:r>
+              <a:rPr lang="en-US" dirty="0" smtClean="0"/>
+              <a:t>INTEGRATIONS</a:t>
             </a:r>
             <a:endParaRPr lang="en-US" dirty="0"/>
           </a:p>
@@ -26314,63 +26162,32 @@
         </p:nvSpPr>
         <p:spPr/>
         <p:txBody>
-          <a:bodyPr/>
+          <a:bodyPr anchor="ctr"/>
           <a:lstStyle/>
           <a:p>
             <a:r>
               <a:rPr lang="en-US" dirty="0" smtClean="0"/>
-              <a:t>Website:</a:t>
-            </a:r>
-          </a:p>
-          <a:p>
-            <a:pPr lvl="1"/>
-            <a:r>
-              <a:rPr lang="en-US" dirty="0">
-                <a:hlinkClick r:id="rId2"/>
-              </a:rPr>
-              <a:t>https://</a:t>
-            </a:r>
-            <a:r>
-              <a:rPr lang="en-US" dirty="0" smtClean="0">
-                <a:hlinkClick r:id="rId2"/>
-              </a:rPr>
-              <a:t>uwaterloo.ca/information-systems-technology/about/organizational-structure/enterprise-architecture-ea</a:t>
-            </a:r>
+              <a:t>HR / Finance Integration Normalization</a:t>
+            </a:r>
+          </a:p>
+          <a:p>
+            <a:endParaRPr lang="en-US" dirty="0"/>
+          </a:p>
+          <a:p>
+            <a:r>
+              <a:rPr lang="en-US" dirty="0" smtClean="0"/>
+              <a:t>Developing API Capabilities</a:t>
+            </a:r>
+            <a:endParaRPr lang="en-US" dirty="0"/>
+          </a:p>
+          <a:p>
             <a:endParaRPr lang="en-US" dirty="0" smtClean="0"/>
           </a:p>
           <a:p>
-            <a:pPr lvl="1"/>
             <a:r>
               <a:rPr lang="en-US" dirty="0" smtClean="0"/>
-              <a:t>Links to framework documentation will be released here.</a:t>
-            </a:r>
-          </a:p>
-          <a:p>
-            <a:pPr lvl="1"/>
-            <a:endParaRPr lang="en-US" dirty="0"/>
-          </a:p>
-          <a:p>
-            <a:r>
-              <a:rPr lang="en-US" dirty="0" smtClean="0"/>
-              <a:t>Contact:</a:t>
-            </a:r>
-          </a:p>
-          <a:p>
-            <a:pPr lvl="1"/>
-            <a:r>
-              <a:rPr lang="en-US" dirty="0" smtClean="0"/>
-              <a:t>Direct email to </a:t>
-            </a:r>
-            <a:r>
-              <a:rPr lang="en-US" dirty="0" smtClean="0">
-                <a:hlinkClick r:id="rId3"/>
-              </a:rPr>
-              <a:t>ist-ea@uwaterloo.ca</a:t>
-            </a:r>
-            <a:endParaRPr lang="en-US" dirty="0"/>
-          </a:p>
-          <a:p>
-            <a:endParaRPr lang="en-US" dirty="0"/>
+              <a:t>Warehousing Student Data (QUEST)</a:t>
+            </a:r>
           </a:p>
         </p:txBody>
       </p:sp>
@@ -26403,7 +26220,7 @@
     </p:spTree>
     <p:extLst>
       <p:ext uri="{BB962C8B-B14F-4D97-AF65-F5344CB8AC3E}">
-        <p14:creationId xmlns:p14="http://schemas.microsoft.com/office/powerpoint/2010/main" val="1670188469"/>
+        <p14:creationId xmlns:p14="http://schemas.microsoft.com/office/powerpoint/2010/main" val="772917458"/>
       </p:ext>
     </p:extLst>
   </p:cSld>
@@ -26439,6 +26256,519 @@
       </p:grpSpPr>
       <p:sp>
         <p:nvSpPr>
+          <p:cNvPr id="2" name="Title 1"/>
+          <p:cNvSpPr>
+            <a:spLocks noGrp="1"/>
+          </p:cNvSpPr>
+          <p:nvPr>
+            <p:ph type="title"/>
+          </p:nvPr>
+        </p:nvSpPr>
+        <p:spPr>
+          <a:xfrm>
+            <a:off x="457200" y="2492520"/>
+            <a:ext cx="8229600" cy="1143000"/>
+          </a:xfrm>
+        </p:spPr>
+        <p:txBody>
+          <a:bodyPr>
+            <a:normAutofit fontScale="90000"/>
+          </a:bodyPr>
+          <a:lstStyle/>
+          <a:p>
+            <a:pPr algn="ctr"/>
+            <a:r>
+              <a:rPr lang="en-US" dirty="0" smtClean="0"/>
+              <a:t>When?</a:t>
+            </a:r>
+            <a:br>
+              <a:rPr lang="en-US" dirty="0" smtClean="0"/>
+            </a:br>
+            <a:r>
+              <a:rPr lang="en-US" dirty="0"/>
+              <a:t/>
+            </a:r>
+            <a:br>
+              <a:rPr lang="en-US" dirty="0"/>
+            </a:br>
+            <a:r>
+              <a:rPr lang="en-US" dirty="0" smtClean="0"/>
+              <a:t>Can you get involved</a:t>
+            </a:r>
+            <a:endParaRPr lang="en-US" dirty="0"/>
+          </a:p>
+        </p:txBody>
+      </p:sp>
+      <p:sp>
+        <p:nvSpPr>
+          <p:cNvPr id="4" name="Footer Placeholder 3"/>
+          <p:cNvSpPr>
+            <a:spLocks noGrp="1"/>
+          </p:cNvSpPr>
+          <p:nvPr>
+            <p:ph type="ftr" sz="quarter" idx="10"/>
+          </p:nvPr>
+        </p:nvSpPr>
+        <p:spPr/>
+        <p:txBody>
+          <a:bodyPr/>
+          <a:lstStyle/>
+          <a:p>
+            <a:pPr>
+              <a:defRPr/>
+            </a:pPr>
+            <a:r>
+              <a:rPr lang="en-US" dirty="0" smtClean="0"/>
+              <a:t>Enterprise Architecture @ Waterloo</a:t>
+            </a:r>
+            <a:endParaRPr lang="en-US" dirty="0"/>
+          </a:p>
+        </p:txBody>
+      </p:sp>
+    </p:spTree>
+    <p:extLst>
+      <p:ext uri="{BB962C8B-B14F-4D97-AF65-F5344CB8AC3E}">
+        <p14:creationId xmlns:p14="http://schemas.microsoft.com/office/powerpoint/2010/main" val="1296925850"/>
+      </p:ext>
+    </p:extLst>
+  </p:cSld>
+  <p:clrMapOvr>
+    <a:masterClrMapping/>
+  </p:clrMapOvr>
+  <p:timing>
+    <p:tnLst>
+      <p:par>
+        <p:cTn id="1" dur="indefinite" restart="never" nodeType="tmRoot"/>
+      </p:par>
+    </p:tnLst>
+  </p:timing>
+</p:sld>
+</file>
+
+<file path=ppt/slides/slide52.xml><?xml version="1.0" encoding="utf-8"?>
+<p:sld xmlns:a="http://schemas.openxmlformats.org/drawingml/2006/main" xmlns:r="http://schemas.openxmlformats.org/officeDocument/2006/relationships" xmlns:p="http://schemas.openxmlformats.org/presentationml/2006/main">
+  <p:cSld>
+    <p:spTree>
+      <p:nvGrpSpPr>
+        <p:cNvPr id="1" name=""/>
+        <p:cNvGrpSpPr/>
+        <p:nvPr/>
+      </p:nvGrpSpPr>
+      <p:grpSpPr>
+        <a:xfrm>
+          <a:off x="0" y="0"/>
+          <a:ext cx="0" cy="0"/>
+          <a:chOff x="0" y="0"/>
+          <a:chExt cx="0" cy="0"/>
+        </a:xfrm>
+      </p:grpSpPr>
+      <p:sp>
+        <p:nvSpPr>
+          <p:cNvPr id="2" name="Title 1"/>
+          <p:cNvSpPr>
+            <a:spLocks noGrp="1"/>
+          </p:cNvSpPr>
+          <p:nvPr>
+            <p:ph type="title"/>
+          </p:nvPr>
+        </p:nvSpPr>
+        <p:spPr/>
+        <p:txBody>
+          <a:bodyPr/>
+          <a:lstStyle/>
+          <a:p>
+            <a:r>
+              <a:rPr lang="en-US" dirty="0" smtClean="0"/>
+              <a:t>Get involved NOW!</a:t>
+            </a:r>
+            <a:endParaRPr lang="en-US" dirty="0"/>
+          </a:p>
+        </p:txBody>
+      </p:sp>
+      <p:sp>
+        <p:nvSpPr>
+          <p:cNvPr id="3" name="Content Placeholder 2"/>
+          <p:cNvSpPr>
+            <a:spLocks noGrp="1"/>
+          </p:cNvSpPr>
+          <p:nvPr>
+            <p:ph idx="1"/>
+          </p:nvPr>
+        </p:nvSpPr>
+        <p:spPr/>
+        <p:txBody>
+          <a:bodyPr/>
+          <a:lstStyle/>
+          <a:p>
+            <a:r>
+              <a:rPr lang="en-US" dirty="0" smtClean="0"/>
+              <a:t>Many of you are creating architecture artifacts today.</a:t>
+            </a:r>
+          </a:p>
+          <a:p>
+            <a:endParaRPr lang="en-US" dirty="0"/>
+          </a:p>
+          <a:p>
+            <a:r>
+              <a:rPr lang="en-US" dirty="0" smtClean="0"/>
+              <a:t>The EA team needs to know about your work to begin understanding how to leverage it towards a ‘strategic information asset base.’</a:t>
+            </a:r>
+          </a:p>
+          <a:p>
+            <a:endParaRPr lang="en-US" dirty="0"/>
+          </a:p>
+          <a:p>
+            <a:r>
+              <a:rPr lang="en-US" dirty="0" smtClean="0"/>
+              <a:t>We are archeologists, ethnographers, and documenters.  You are the designers!</a:t>
+            </a:r>
+          </a:p>
+          <a:p>
+            <a:endParaRPr lang="en-US" dirty="0"/>
+          </a:p>
+          <a:p>
+            <a:endParaRPr lang="en-US" dirty="0"/>
+          </a:p>
+        </p:txBody>
+      </p:sp>
+      <p:sp>
+        <p:nvSpPr>
+          <p:cNvPr id="4" name="Footer Placeholder 3"/>
+          <p:cNvSpPr>
+            <a:spLocks noGrp="1"/>
+          </p:cNvSpPr>
+          <p:nvPr>
+            <p:ph type="ftr" sz="quarter" idx="10"/>
+          </p:nvPr>
+        </p:nvSpPr>
+        <p:spPr/>
+        <p:txBody>
+          <a:bodyPr/>
+          <a:lstStyle/>
+          <a:p>
+            <a:pPr>
+              <a:defRPr/>
+            </a:pPr>
+            <a:r>
+              <a:rPr lang="en-US" dirty="0" smtClean="0"/>
+              <a:t>Enterprise Architecture @ Waterloo</a:t>
+            </a:r>
+            <a:endParaRPr lang="en-US" dirty="0"/>
+          </a:p>
+        </p:txBody>
+      </p:sp>
+    </p:spTree>
+    <p:extLst>
+      <p:ext uri="{BB962C8B-B14F-4D97-AF65-F5344CB8AC3E}">
+        <p14:creationId xmlns:p14="http://schemas.microsoft.com/office/powerpoint/2010/main" val="1127070848"/>
+      </p:ext>
+    </p:extLst>
+  </p:cSld>
+  <p:clrMapOvr>
+    <a:masterClrMapping/>
+  </p:clrMapOvr>
+  <p:timing>
+    <p:tnLst>
+      <p:par>
+        <p:cTn id="1" dur="indefinite" restart="never" nodeType="tmRoot"/>
+      </p:par>
+    </p:tnLst>
+  </p:timing>
+</p:sld>
+</file>
+
+<file path=ppt/slides/slide53.xml><?xml version="1.0" encoding="utf-8"?>
+<p:sld xmlns:a="http://schemas.openxmlformats.org/drawingml/2006/main" xmlns:r="http://schemas.openxmlformats.org/officeDocument/2006/relationships" xmlns:p="http://schemas.openxmlformats.org/presentationml/2006/main">
+  <p:cSld>
+    <p:spTree>
+      <p:nvGrpSpPr>
+        <p:cNvPr id="1" name=""/>
+        <p:cNvGrpSpPr/>
+        <p:nvPr/>
+      </p:nvGrpSpPr>
+      <p:grpSpPr>
+        <a:xfrm>
+          <a:off x="0" y="0"/>
+          <a:ext cx="0" cy="0"/>
+          <a:chOff x="0" y="0"/>
+          <a:chExt cx="0" cy="0"/>
+        </a:xfrm>
+      </p:grpSpPr>
+      <p:sp>
+        <p:nvSpPr>
+          <p:cNvPr id="2" name="Title 1"/>
+          <p:cNvSpPr>
+            <a:spLocks noGrp="1"/>
+          </p:cNvSpPr>
+          <p:nvPr>
+            <p:ph type="title"/>
+          </p:nvPr>
+        </p:nvSpPr>
+        <p:spPr/>
+        <p:txBody>
+          <a:bodyPr>
+            <a:normAutofit fontScale="90000"/>
+          </a:bodyPr>
+          <a:lstStyle/>
+          <a:p>
+            <a:r>
+              <a:rPr lang="en-US" dirty="0" smtClean="0"/>
+              <a:t>Where do you have expertise?</a:t>
+            </a:r>
+            <a:br>
+              <a:rPr lang="en-US" dirty="0" smtClean="0"/>
+            </a:br>
+            <a:endParaRPr lang="en-US" dirty="0"/>
+          </a:p>
+        </p:txBody>
+      </p:sp>
+      <p:sp>
+        <p:nvSpPr>
+          <p:cNvPr id="4" name="Footer Placeholder 3"/>
+          <p:cNvSpPr>
+            <a:spLocks noGrp="1"/>
+          </p:cNvSpPr>
+          <p:nvPr>
+            <p:ph type="ftr" sz="quarter" idx="10"/>
+          </p:nvPr>
+        </p:nvSpPr>
+        <p:spPr/>
+        <p:txBody>
+          <a:bodyPr/>
+          <a:lstStyle/>
+          <a:p>
+            <a:pPr>
+              <a:defRPr/>
+            </a:pPr>
+            <a:r>
+              <a:rPr lang="en-US" dirty="0" smtClean="0"/>
+              <a:t>Enterprise Architecture @ Waterloo</a:t>
+            </a:r>
+            <a:endParaRPr lang="en-US" dirty="0"/>
+          </a:p>
+        </p:txBody>
+      </p:sp>
+      <p:pic>
+        <p:nvPicPr>
+          <p:cNvPr id="5" name="Picture 4"/>
+          <p:cNvPicPr>
+            <a:picLocks noChangeAspect="1"/>
+          </p:cNvPicPr>
+          <p:nvPr/>
+        </p:nvPicPr>
+        <p:blipFill>
+          <a:blip r:embed="rId3"/>
+          <a:stretch>
+            <a:fillRect/>
+          </a:stretch>
+        </p:blipFill>
+        <p:spPr>
+          <a:xfrm>
+            <a:off x="1803400" y="1330285"/>
+            <a:ext cx="5537200" cy="3479800"/>
+          </a:xfrm>
+          <a:prstGeom prst="rect">
+            <a:avLst/>
+          </a:prstGeom>
+        </p:spPr>
+      </p:pic>
+    </p:spTree>
+    <p:extLst>
+      <p:ext uri="{BB962C8B-B14F-4D97-AF65-F5344CB8AC3E}">
+        <p14:creationId xmlns:p14="http://schemas.microsoft.com/office/powerpoint/2010/main" val="121871606"/>
+      </p:ext>
+    </p:extLst>
+  </p:cSld>
+  <p:clrMapOvr>
+    <a:masterClrMapping/>
+  </p:clrMapOvr>
+  <p:timing>
+    <p:tnLst>
+      <p:par>
+        <p:cTn id="1" dur="indefinite" restart="never" nodeType="tmRoot"/>
+      </p:par>
+    </p:tnLst>
+  </p:timing>
+</p:sld>
+</file>
+
+<file path=ppt/slides/slide54.xml><?xml version="1.0" encoding="utf-8"?>
+<p:sld xmlns:a="http://schemas.openxmlformats.org/drawingml/2006/main" xmlns:r="http://schemas.openxmlformats.org/officeDocument/2006/relationships" xmlns:p="http://schemas.openxmlformats.org/presentationml/2006/main">
+  <p:cSld>
+    <p:spTree>
+      <p:nvGrpSpPr>
+        <p:cNvPr id="1" name=""/>
+        <p:cNvGrpSpPr/>
+        <p:nvPr/>
+      </p:nvGrpSpPr>
+      <p:grpSpPr>
+        <a:xfrm>
+          <a:off x="0" y="0"/>
+          <a:ext cx="0" cy="0"/>
+          <a:chOff x="0" y="0"/>
+          <a:chExt cx="0" cy="0"/>
+        </a:xfrm>
+      </p:grpSpPr>
+      <p:sp>
+        <p:nvSpPr>
+          <p:cNvPr id="2" name="Title 1"/>
+          <p:cNvSpPr>
+            <a:spLocks noGrp="1"/>
+          </p:cNvSpPr>
+          <p:nvPr>
+            <p:ph type="title"/>
+          </p:nvPr>
+        </p:nvSpPr>
+        <p:spPr/>
+        <p:txBody>
+          <a:bodyPr/>
+          <a:lstStyle/>
+          <a:p>
+            <a:r>
+              <a:rPr lang="en-US" dirty="0" smtClean="0"/>
+              <a:t>We are ready when you are!</a:t>
+            </a:r>
+            <a:endParaRPr lang="en-US" dirty="0"/>
+          </a:p>
+        </p:txBody>
+      </p:sp>
+      <p:sp>
+        <p:nvSpPr>
+          <p:cNvPr id="3" name="Content Placeholder 2"/>
+          <p:cNvSpPr>
+            <a:spLocks noGrp="1"/>
+          </p:cNvSpPr>
+          <p:nvPr>
+            <p:ph idx="1"/>
+          </p:nvPr>
+        </p:nvSpPr>
+        <p:spPr/>
+        <p:txBody>
+          <a:bodyPr/>
+          <a:lstStyle/>
+          <a:p>
+            <a:r>
+              <a:rPr lang="en-US" dirty="0" smtClean="0"/>
+              <a:t>Website:</a:t>
+            </a:r>
+          </a:p>
+          <a:p>
+            <a:pPr lvl="1"/>
+            <a:r>
+              <a:rPr lang="en-US" dirty="0">
+                <a:hlinkClick r:id="rId2"/>
+              </a:rPr>
+              <a:t>https://</a:t>
+            </a:r>
+            <a:r>
+              <a:rPr lang="en-US" dirty="0" smtClean="0">
+                <a:hlinkClick r:id="rId2"/>
+              </a:rPr>
+              <a:t>uwaterloo.ca/information-systems-technology/about/organizational-structure/enterprise-architecture-ea</a:t>
+            </a:r>
+            <a:endParaRPr lang="en-US" dirty="0" smtClean="0"/>
+          </a:p>
+          <a:p>
+            <a:pPr lvl="1"/>
+            <a:r>
+              <a:rPr lang="en-US" dirty="0" smtClean="0"/>
+              <a:t>Links to framework documentation will be released here.</a:t>
+            </a:r>
+          </a:p>
+          <a:p>
+            <a:pPr lvl="1"/>
+            <a:endParaRPr lang="en-US" dirty="0"/>
+          </a:p>
+          <a:p>
+            <a:r>
+              <a:rPr lang="en-US" dirty="0" smtClean="0"/>
+              <a:t>Contact:</a:t>
+            </a:r>
+          </a:p>
+          <a:p>
+            <a:pPr lvl="1"/>
+            <a:r>
+              <a:rPr lang="en-US" dirty="0" smtClean="0"/>
+              <a:t>Direct email to </a:t>
+            </a:r>
+            <a:r>
+              <a:rPr lang="en-US" dirty="0" smtClean="0">
+                <a:hlinkClick r:id="rId3"/>
+              </a:rPr>
+              <a:t>ist-ea@uwaterloo.ca</a:t>
+            </a:r>
+            <a:endParaRPr lang="en-US" dirty="0"/>
+          </a:p>
+          <a:p>
+            <a:endParaRPr lang="en-US" dirty="0"/>
+          </a:p>
+        </p:txBody>
+      </p:sp>
+      <p:sp>
+        <p:nvSpPr>
+          <p:cNvPr id="4" name="Footer Placeholder 3"/>
+          <p:cNvSpPr>
+            <a:spLocks noGrp="1"/>
+          </p:cNvSpPr>
+          <p:nvPr>
+            <p:ph type="ftr" sz="quarter" idx="10"/>
+          </p:nvPr>
+        </p:nvSpPr>
+        <p:spPr/>
+        <p:txBody>
+          <a:bodyPr/>
+          <a:lstStyle/>
+          <a:p>
+            <a:pPr>
+              <a:defRPr/>
+            </a:pPr>
+            <a:r>
+              <a:rPr lang="en-US" dirty="0" smtClean="0"/>
+              <a:t>Enterprise Architecture @ Waterloo</a:t>
+            </a:r>
+            <a:endParaRPr lang="en-US" dirty="0"/>
+          </a:p>
+        </p:txBody>
+      </p:sp>
+    </p:spTree>
+    <p:extLst>
+      <p:ext uri="{BB962C8B-B14F-4D97-AF65-F5344CB8AC3E}">
+        <p14:creationId xmlns:p14="http://schemas.microsoft.com/office/powerpoint/2010/main" val="1670188469"/>
+      </p:ext>
+    </p:extLst>
+  </p:cSld>
+  <p:clrMapOvr>
+    <a:masterClrMapping/>
+  </p:clrMapOvr>
+  <p:timing>
+    <p:tnLst>
+      <p:par>
+        <p:cTn id="1" dur="indefinite" restart="never" nodeType="tmRoot"/>
+      </p:par>
+    </p:tnLst>
+  </p:timing>
+</p:sld>
+</file>
+
+<file path=ppt/slides/slide55.xml><?xml version="1.0" encoding="utf-8"?>
+<p:sld xmlns:a="http://schemas.openxmlformats.org/drawingml/2006/main" xmlns:r="http://schemas.openxmlformats.org/officeDocument/2006/relationships" xmlns:p="http://schemas.openxmlformats.org/presentationml/2006/main">
+  <p:cSld>
+    <p:spTree>
+      <p:nvGrpSpPr>
+        <p:cNvPr id="1" name=""/>
+        <p:cNvGrpSpPr/>
+        <p:nvPr/>
+      </p:nvGrpSpPr>
+      <p:grpSpPr>
+        <a:xfrm>
+          <a:off x="0" y="0"/>
+          <a:ext cx="0" cy="0"/>
+          <a:chOff x="0" y="0"/>
+          <a:chExt cx="0" cy="0"/>
+        </a:xfrm>
+      </p:grpSpPr>
+      <p:sp>
+        <p:nvSpPr>
           <p:cNvPr id="12289" name="Footer Placeholder 3"/>
           <p:cNvSpPr>
             <a:spLocks noGrp="1"/>
@@ -26451,14 +26781,14 @@
           <a:noFill/>
           <a:extLst>
             <a:ext uri="{909E8E84-426E-40dd-AFC4-6F175D3DCCD1}">
-              <a14:hiddenFill xmlns:a14="http://schemas.microsoft.com/office/drawing/2010/main" xmlns="">
+              <a14:hiddenFill xmlns="" xmlns:a14="http://schemas.microsoft.com/office/drawing/2010/main">
                 <a:solidFill>
                   <a:srgbClr val="FFFFFF"/>
                 </a:solidFill>
               </a14:hiddenFill>
             </a:ext>
             <a:ext uri="{91240B29-F687-4f45-9708-019B960494DF}">
-              <a14:hiddenLine xmlns:a14="http://schemas.microsoft.com/office/drawing/2010/main" xmlns="" w="9525">
+              <a14:hiddenLine xmlns="" xmlns:a14="http://schemas.microsoft.com/office/drawing/2010/main" w="9525">
                 <a:solidFill>
                   <a:srgbClr val="000000"/>
                 </a:solidFill>
@@ -26761,14 +27091,14 @@
           </a:ln>
           <a:extLst>
             <a:ext uri="{909E8E84-426E-40dd-AFC4-6F175D3DCCD1}">
-              <a14:hiddenFill xmlns:a14="http://schemas.microsoft.com/office/drawing/2010/main" xmlns="">
+              <a14:hiddenFill xmlns="" xmlns:a14="http://schemas.microsoft.com/office/drawing/2010/main">
                 <a:solidFill>
                   <a:srgbClr val="FFFFFF"/>
                 </a:solidFill>
               </a14:hiddenFill>
             </a:ext>
             <a:ext uri="{91240B29-F687-4f45-9708-019B960494DF}">
-              <a14:hiddenLine xmlns:a14="http://schemas.microsoft.com/office/drawing/2010/main" xmlns="" w="9525">
+              <a14:hiddenLine xmlns="" xmlns:a14="http://schemas.microsoft.com/office/drawing/2010/main" w="9525">
                 <a:solidFill>
                   <a:srgbClr val="000000"/>
                 </a:solidFill>
@@ -27097,11 +27427,7 @@
             <a:pPr algn="ctr"/>
             <a:r>
               <a:rPr lang="en-US" dirty="0" smtClean="0"/>
-              <a:t>WHY</a:t>
-            </a:r>
-            <a:r>
-              <a:rPr lang="en-US" dirty="0" smtClean="0"/>
-              <a:t>?</a:t>
+              <a:t>WHY?</a:t>
             </a:r>
             <a:br>
               <a:rPr lang="en-US" dirty="0" smtClean="0"/>

</xml_diff>